<commit_message>
avances en la presentacion
</commit_message>
<xml_diff>
--- a/Presentacion POO APP.pptx
+++ b/Presentacion POO APP.pptx
@@ -28,10 +28,10 @@
     <p:sldId id="287" r:id="rId22"/>
     <p:sldId id="289" r:id="rId23"/>
     <p:sldId id="282" r:id="rId24"/>
-    <p:sldId id="295" r:id="rId25"/>
-    <p:sldId id="292" r:id="rId26"/>
-    <p:sldId id="291" r:id="rId27"/>
-    <p:sldId id="296" r:id="rId28"/>
+    <p:sldId id="303" r:id="rId25"/>
+    <p:sldId id="305" r:id="rId26"/>
+    <p:sldId id="292" r:id="rId27"/>
+    <p:sldId id="291" r:id="rId28"/>
     <p:sldId id="297" r:id="rId29"/>
     <p:sldId id="298" r:id="rId30"/>
     <p:sldId id="299" r:id="rId31"/>
@@ -364,7 +364,7 @@
             <a:fld id="{1D8BD707-D9CF-40AE-B4C6-C98DA3205C09}" type="datetimeFigureOut">
               <a:rPr lang="en-US" smtClean="0"/>
               <a:pPr/>
-              <a:t>3/31/2024</a:t>
+              <a:t>4/3/2024</a:t>
             </a:fld>
             <a:endParaRPr lang="en-US"/>
           </a:p>
@@ -529,7 +529,7 @@
             <a:fld id="{1D8BD707-D9CF-40AE-B4C6-C98DA3205C09}" type="datetimeFigureOut">
               <a:rPr lang="en-US" smtClean="0"/>
               <a:pPr/>
-              <a:t>3/31/2024</a:t>
+              <a:t>4/3/2024</a:t>
             </a:fld>
             <a:endParaRPr lang="en-US"/>
           </a:p>
@@ -704,7 +704,7 @@
             <a:fld id="{1D8BD707-D9CF-40AE-B4C6-C98DA3205C09}" type="datetimeFigureOut">
               <a:rPr lang="en-US" smtClean="0"/>
               <a:pPr/>
-              <a:t>3/31/2024</a:t>
+              <a:t>4/3/2024</a:t>
             </a:fld>
             <a:endParaRPr lang="en-US"/>
           </a:p>
@@ -869,7 +869,7 @@
             <a:fld id="{1D8BD707-D9CF-40AE-B4C6-C98DA3205C09}" type="datetimeFigureOut">
               <a:rPr lang="en-US" smtClean="0"/>
               <a:pPr/>
-              <a:t>3/31/2024</a:t>
+              <a:t>4/3/2024</a:t>
             </a:fld>
             <a:endParaRPr lang="en-US"/>
           </a:p>
@@ -1111,7 +1111,7 @@
             <a:fld id="{1D8BD707-D9CF-40AE-B4C6-C98DA3205C09}" type="datetimeFigureOut">
               <a:rPr lang="en-US" smtClean="0"/>
               <a:pPr/>
-              <a:t>3/31/2024</a:t>
+              <a:t>4/3/2024</a:t>
             </a:fld>
             <a:endParaRPr lang="en-US"/>
           </a:p>
@@ -1393,7 +1393,7 @@
             <a:fld id="{1D8BD707-D9CF-40AE-B4C6-C98DA3205C09}" type="datetimeFigureOut">
               <a:rPr lang="en-US" smtClean="0"/>
               <a:pPr/>
-              <a:t>3/31/2024</a:t>
+              <a:t>4/3/2024</a:t>
             </a:fld>
             <a:endParaRPr lang="en-US"/>
           </a:p>
@@ -1809,7 +1809,7 @@
             <a:fld id="{1D8BD707-D9CF-40AE-B4C6-C98DA3205C09}" type="datetimeFigureOut">
               <a:rPr lang="en-US" smtClean="0"/>
               <a:pPr/>
-              <a:t>3/31/2024</a:t>
+              <a:t>4/3/2024</a:t>
             </a:fld>
             <a:endParaRPr lang="en-US"/>
           </a:p>
@@ -1923,7 +1923,7 @@
             <a:fld id="{1D8BD707-D9CF-40AE-B4C6-C98DA3205C09}" type="datetimeFigureOut">
               <a:rPr lang="en-US" smtClean="0"/>
               <a:pPr/>
-              <a:t>3/31/2024</a:t>
+              <a:t>4/3/2024</a:t>
             </a:fld>
             <a:endParaRPr lang="en-US"/>
           </a:p>
@@ -2015,7 +2015,7 @@
             <a:fld id="{1D8BD707-D9CF-40AE-B4C6-C98DA3205C09}" type="datetimeFigureOut">
               <a:rPr lang="en-US" smtClean="0"/>
               <a:pPr/>
-              <a:t>3/31/2024</a:t>
+              <a:t>4/3/2024</a:t>
             </a:fld>
             <a:endParaRPr lang="en-US"/>
           </a:p>
@@ -2287,7 +2287,7 @@
             <a:fld id="{1D8BD707-D9CF-40AE-B4C6-C98DA3205C09}" type="datetimeFigureOut">
               <a:rPr lang="en-US" smtClean="0"/>
               <a:pPr/>
-              <a:t>3/31/2024</a:t>
+              <a:t>4/3/2024</a:t>
             </a:fld>
             <a:endParaRPr lang="en-US"/>
           </a:p>
@@ -2536,7 +2536,7 @@
             <a:fld id="{1D8BD707-D9CF-40AE-B4C6-C98DA3205C09}" type="datetimeFigureOut">
               <a:rPr lang="en-US" smtClean="0"/>
               <a:pPr/>
-              <a:t>3/31/2024</a:t>
+              <a:t>4/3/2024</a:t>
             </a:fld>
             <a:endParaRPr lang="en-US"/>
           </a:p>
@@ -2744,7 +2744,7 @@
             <a:fld id="{1D8BD707-D9CF-40AE-B4C6-C98DA3205C09}" type="datetimeFigureOut">
               <a:rPr lang="en-US" smtClean="0"/>
               <a:pPr/>
-              <a:t>3/31/2024</a:t>
+              <a:t>4/3/2024</a:t>
             </a:fld>
             <a:endParaRPr lang="en-US"/>
           </a:p>
@@ -5681,295 +5681,52 @@
       </p:grpSpPr>
       <p:sp>
         <p:nvSpPr>
-          <p:cNvPr id="2" name="TextBox 2">
-            <a:extLst>
-              <a:ext uri="{FF2B5EF4-FFF2-40B4-BE49-F238E27FC236}">
-                <a16:creationId xmlns:a16="http://schemas.microsoft.com/office/drawing/2014/main" id="{29B2CFD1-7A47-C52E-EC73-77871C16598C}"/>
-              </a:ext>
-            </a:extLst>
-          </p:cNvPr>
+          <p:cNvPr id="2" name="TextBox 2"/>
           <p:cNvSpPr txBox="1"/>
           <p:nvPr/>
         </p:nvSpPr>
         <p:spPr>
           <a:xfrm>
-            <a:off x="2329883" y="3942080"/>
-            <a:ext cx="7419857" cy="3180358"/>
+            <a:off x="4847000" y="4305300"/>
+            <a:ext cx="8593999" cy="1384674"/>
           </a:xfrm>
           <a:prstGeom prst="rect">
             <a:avLst/>
           </a:prstGeom>
         </p:spPr>
         <p:txBody>
-          <a:bodyPr lIns="0" tIns="0" rIns="0" bIns="0" rtlCol="0" anchor="t">
+          <a:bodyPr wrap="square" lIns="0" tIns="0" rIns="0" bIns="0" rtlCol="0" anchor="t">
             <a:spAutoFit/>
           </a:bodyPr>
           <a:lstStyle/>
           <a:p>
-            <a:pPr>
+            <a:pPr algn="ctr">
               <a:lnSpc>
-                <a:spcPts val="6159"/>
+                <a:spcPts val="11000"/>
               </a:lnSpc>
             </a:pPr>
             <a:r>
-              <a:rPr lang="en-US" sz="4399" dirty="0" err="1">
-                <a:solidFill>
-                  <a:srgbClr val="000000"/>
-                </a:solidFill>
-                <a:latin typeface="Catamaran Light"/>
-              </a:rPr>
-              <a:t>Mostrar</a:t>
-            </a:r>
-            <a:r>
-              <a:rPr lang="en-US" sz="4399" dirty="0">
-                <a:solidFill>
-                  <a:srgbClr val="000000"/>
-                </a:solidFill>
-                <a:latin typeface="Catamaran Light"/>
-              </a:rPr>
-              <a:t> </a:t>
-            </a:r>
-            <a:r>
-              <a:rPr lang="en-US" sz="4399" dirty="0" err="1">
-                <a:solidFill>
-                  <a:srgbClr val="000000"/>
-                </a:solidFill>
-                <a:latin typeface="Catamaran Light"/>
-              </a:rPr>
-              <a:t>en</a:t>
-            </a:r>
-            <a:r>
-              <a:rPr lang="en-US" sz="4399" dirty="0">
-                <a:solidFill>
-                  <a:srgbClr val="000000"/>
-                </a:solidFill>
-                <a:latin typeface="Catamaran Light"/>
-              </a:rPr>
-              <a:t> </a:t>
-            </a:r>
-            <a:r>
-              <a:rPr lang="en-US" sz="4399" dirty="0" err="1">
-                <a:solidFill>
-                  <a:srgbClr val="000000"/>
-                </a:solidFill>
-                <a:latin typeface="Catamaran Light"/>
-              </a:rPr>
-              <a:t>codigo</a:t>
-            </a:r>
-            <a:r>
-              <a:rPr lang="en-US" sz="4399" dirty="0">
-                <a:solidFill>
-                  <a:srgbClr val="000000"/>
-                </a:solidFill>
-                <a:latin typeface="Catamaran Light"/>
-              </a:rPr>
-              <a:t>. </a:t>
-            </a:r>
-            <a:r>
-              <a:rPr lang="en-US" sz="4399" dirty="0" err="1">
-                <a:solidFill>
-                  <a:srgbClr val="000000"/>
-                </a:solidFill>
-                <a:latin typeface="Catamaran Light"/>
-              </a:rPr>
-              <a:t>como</a:t>
-            </a:r>
-            <a:r>
-              <a:rPr lang="en-US" sz="4399" dirty="0">
-                <a:solidFill>
-                  <a:srgbClr val="000000"/>
-                </a:solidFill>
-                <a:latin typeface="Catamaran Light"/>
-              </a:rPr>
-              <a:t> al </a:t>
-            </a:r>
-            <a:r>
-              <a:rPr lang="en-US" sz="4399" dirty="0" err="1">
-                <a:solidFill>
-                  <a:srgbClr val="000000"/>
-                </a:solidFill>
-                <a:latin typeface="Catamaran Light"/>
-              </a:rPr>
-              <a:t>hacer</a:t>
-            </a:r>
-            <a:r>
-              <a:rPr lang="en-US" sz="4399" dirty="0">
-                <a:solidFill>
-                  <a:srgbClr val="000000"/>
-                </a:solidFill>
-                <a:latin typeface="Catamaran Light"/>
-              </a:rPr>
-              <a:t> </a:t>
-            </a:r>
-            <a:r>
-              <a:rPr lang="en-US" sz="4399" dirty="0" err="1">
-                <a:solidFill>
-                  <a:srgbClr val="000000"/>
-                </a:solidFill>
-                <a:latin typeface="Catamaran Light"/>
-              </a:rPr>
-              <a:t>una</a:t>
-            </a:r>
-            <a:r>
-              <a:rPr lang="en-US" sz="4399" dirty="0">
-                <a:solidFill>
-                  <a:srgbClr val="000000"/>
-                </a:solidFill>
-                <a:latin typeface="Catamaran Light"/>
-              </a:rPr>
-              <a:t> </a:t>
-            </a:r>
-            <a:r>
-              <a:rPr lang="en-US" sz="4399" dirty="0" err="1">
-                <a:solidFill>
-                  <a:srgbClr val="000000"/>
-                </a:solidFill>
-                <a:latin typeface="Catamaran Light"/>
-              </a:rPr>
-              <a:t>clase</a:t>
-            </a:r>
-            <a:r>
-              <a:rPr lang="en-US" sz="4399" dirty="0">
-                <a:solidFill>
-                  <a:srgbClr val="000000"/>
-                </a:solidFill>
-                <a:latin typeface="Catamaran Light"/>
-              </a:rPr>
-              <a:t> y </a:t>
-            </a:r>
-            <a:r>
-              <a:rPr lang="en-US" sz="4399" dirty="0" err="1">
-                <a:solidFill>
-                  <a:srgbClr val="000000"/>
-                </a:solidFill>
-                <a:latin typeface="Catamaran Light"/>
-              </a:rPr>
-              <a:t>poner</a:t>
-            </a:r>
-            <a:r>
-              <a:rPr lang="en-US" sz="4399" dirty="0">
-                <a:solidFill>
-                  <a:srgbClr val="000000"/>
-                </a:solidFill>
-                <a:latin typeface="Catamaran Light"/>
-              </a:rPr>
-              <a:t> </a:t>
-            </a:r>
-            <a:r>
-              <a:rPr lang="en-US" sz="4399" dirty="0" err="1">
-                <a:solidFill>
-                  <a:srgbClr val="000000"/>
-                </a:solidFill>
-                <a:latin typeface="Catamaran Light"/>
-              </a:rPr>
-              <a:t>en</a:t>
-            </a:r>
-            <a:r>
-              <a:rPr lang="en-US" sz="4399" dirty="0">
-                <a:solidFill>
-                  <a:srgbClr val="000000"/>
-                </a:solidFill>
-                <a:latin typeface="Catamaran Light"/>
-              </a:rPr>
-              <a:t> </a:t>
-            </a:r>
-            <a:r>
-              <a:rPr lang="en-US" sz="4399" dirty="0" err="1">
-                <a:solidFill>
-                  <a:srgbClr val="000000"/>
-                </a:solidFill>
-                <a:latin typeface="Catamaran Light"/>
-              </a:rPr>
-              <a:t>ella</a:t>
-            </a:r>
-            <a:r>
-              <a:rPr lang="en-US" sz="4399" dirty="0">
-                <a:solidFill>
-                  <a:srgbClr val="000000"/>
-                </a:solidFill>
-                <a:latin typeface="Catamaran Light"/>
-              </a:rPr>
-              <a:t> </a:t>
-            </a:r>
-            <a:r>
-              <a:rPr lang="en-US" sz="4399" dirty="0" err="1">
-                <a:solidFill>
-                  <a:srgbClr val="000000"/>
-                </a:solidFill>
-                <a:latin typeface="Catamaran Light"/>
-              </a:rPr>
-              <a:t>atributos</a:t>
-            </a:r>
-            <a:r>
-              <a:rPr lang="en-US" sz="4399" dirty="0">
-                <a:solidFill>
-                  <a:srgbClr val="000000"/>
-                </a:solidFill>
-                <a:latin typeface="Catamaran Light"/>
-              </a:rPr>
-              <a:t> y </a:t>
-            </a:r>
-            <a:r>
-              <a:rPr lang="en-US" sz="4399" dirty="0" err="1">
-                <a:solidFill>
-                  <a:srgbClr val="000000"/>
-                </a:solidFill>
-                <a:latin typeface="Catamaran Light"/>
-              </a:rPr>
-              <a:t>metodos</a:t>
-            </a:r>
-            <a:r>
-              <a:rPr lang="en-US" sz="4399" dirty="0">
-                <a:solidFill>
-                  <a:srgbClr val="000000"/>
-                </a:solidFill>
-                <a:latin typeface="Catamaran Light"/>
-              </a:rPr>
-              <a:t>, </a:t>
-            </a:r>
-            <a:r>
-              <a:rPr lang="en-US" sz="4399" dirty="0" err="1">
-                <a:solidFill>
-                  <a:srgbClr val="000000"/>
-                </a:solidFill>
-                <a:latin typeface="Catamaran Light"/>
-              </a:rPr>
-              <a:t>estamos</a:t>
-            </a:r>
-            <a:r>
-              <a:rPr lang="en-US" sz="4399" dirty="0">
-                <a:solidFill>
-                  <a:srgbClr val="000000"/>
-                </a:solidFill>
-                <a:latin typeface="Catamaran Light"/>
-              </a:rPr>
-              <a:t> </a:t>
-            </a:r>
-            <a:r>
-              <a:rPr lang="en-US" sz="4399" dirty="0" err="1">
-                <a:solidFill>
-                  <a:srgbClr val="000000"/>
-                </a:solidFill>
-                <a:latin typeface="Catamaran Light"/>
-              </a:rPr>
-              <a:t>agrupando-encapsulando</a:t>
-            </a:r>
-            <a:r>
-              <a:rPr lang="en-US" sz="4399" dirty="0">
-                <a:solidFill>
-                  <a:srgbClr val="000000"/>
-                </a:solidFill>
-                <a:latin typeface="Catamaran Light"/>
-              </a:rPr>
-              <a:t>.</a:t>
-            </a:r>
+              <a:rPr lang="en-US" sz="9000" dirty="0" err="1">
+                <a:solidFill>
+                  <a:srgbClr val="000000"/>
+                </a:solidFill>
+                <a:latin typeface="Lovelo"/>
+              </a:rPr>
+              <a:t>agrupar</a:t>
+            </a:r>
+            <a:endParaRPr lang="en-US" sz="9000" dirty="0">
+              <a:solidFill>
+                <a:srgbClr val="000000"/>
+              </a:solidFill>
+              <a:latin typeface="Lovelo"/>
+            </a:endParaRPr>
           </a:p>
         </p:txBody>
       </p:sp>
     </p:spTree>
     <p:extLst>
       <p:ext uri="{BB962C8B-B14F-4D97-AF65-F5344CB8AC3E}">
-        <p14:creationId xmlns:p14="http://schemas.microsoft.com/office/powerpoint/2010/main" val="3965596511"/>
+        <p14:creationId xmlns:p14="http://schemas.microsoft.com/office/powerpoint/2010/main" val="122220413"/>
       </p:ext>
     </p:extLst>
   </p:cSld>
@@ -5980,6 +5737,80 @@
 </file>
 
 <file path=ppt/slides/slide25.xml><?xml version="1.0" encoding="utf-8"?>
+<p:sld xmlns:a="http://schemas.openxmlformats.org/drawingml/2006/main" xmlns:r="http://schemas.openxmlformats.org/officeDocument/2006/relationships" xmlns:p="http://schemas.openxmlformats.org/presentationml/2006/main">
+  <p:cSld>
+    <p:spTree>
+      <p:nvGrpSpPr>
+        <p:cNvPr id="1" name=""/>
+        <p:cNvGrpSpPr/>
+        <p:nvPr/>
+      </p:nvGrpSpPr>
+      <p:grpSpPr>
+        <a:xfrm>
+          <a:off x="0" y="0"/>
+          <a:ext cx="0" cy="0"/>
+          <a:chOff x="0" y="0"/>
+          <a:chExt cx="0" cy="0"/>
+        </a:xfrm>
+      </p:grpSpPr>
+      <p:sp>
+        <p:nvSpPr>
+          <p:cNvPr id="2" name="TextBox 2"/>
+          <p:cNvSpPr txBox="1"/>
+          <p:nvPr/>
+        </p:nvSpPr>
+        <p:spPr>
+          <a:xfrm>
+            <a:off x="3369401" y="4137743"/>
+            <a:ext cx="12117830" cy="1384674"/>
+          </a:xfrm>
+          <a:prstGeom prst="rect">
+            <a:avLst/>
+          </a:prstGeom>
+        </p:spPr>
+        <p:txBody>
+          <a:bodyPr lIns="0" tIns="0" rIns="0" bIns="0" rtlCol="0" anchor="t">
+            <a:spAutoFit/>
+          </a:bodyPr>
+          <a:lstStyle/>
+          <a:p>
+            <a:pPr algn="ctr">
+              <a:lnSpc>
+                <a:spcPts val="11000"/>
+              </a:lnSpc>
+            </a:pPr>
+            <a:r>
+              <a:rPr lang="en-US" sz="9000" dirty="0" err="1">
+                <a:solidFill>
+                  <a:srgbClr val="000000"/>
+                </a:solidFill>
+                <a:latin typeface="Lovelo"/>
+              </a:rPr>
+              <a:t>Ocultar</a:t>
+            </a:r>
+            <a:endParaRPr lang="en-US" sz="9000" dirty="0">
+              <a:solidFill>
+                <a:srgbClr val="000000"/>
+              </a:solidFill>
+              <a:latin typeface="Lovelo"/>
+            </a:endParaRPr>
+          </a:p>
+        </p:txBody>
+      </p:sp>
+    </p:spTree>
+    <p:extLst>
+      <p:ext uri="{BB962C8B-B14F-4D97-AF65-F5344CB8AC3E}">
+        <p14:creationId xmlns:p14="http://schemas.microsoft.com/office/powerpoint/2010/main" val="8934530"/>
+      </p:ext>
+    </p:extLst>
+  </p:cSld>
+  <p:clrMapOvr>
+    <a:masterClrMapping/>
+  </p:clrMapOvr>
+</p:sld>
+</file>
+
+<file path=ppt/slides/slide26.xml><?xml version="1.0" encoding="utf-8"?>
 <p:sld xmlns:a="http://schemas.openxmlformats.org/drawingml/2006/main" xmlns:r="http://schemas.openxmlformats.org/officeDocument/2006/relationships" xmlns:p="http://schemas.openxmlformats.org/presentationml/2006/main">
   <p:cSld>
     <p:bg>
@@ -6758,7 +6589,7 @@
 </p:sld>
 </file>
 
-<file path=ppt/slides/slide26.xml><?xml version="1.0" encoding="utf-8"?>
+<file path=ppt/slides/slide27.xml><?xml version="1.0" encoding="utf-8"?>
 <p:sld xmlns:a="http://schemas.openxmlformats.org/drawingml/2006/main" xmlns:r="http://schemas.openxmlformats.org/officeDocument/2006/relationships" xmlns:p="http://schemas.openxmlformats.org/presentationml/2006/main">
   <p:cSld>
     <p:spTree>
@@ -7039,270 +6870,6 @@
     <p:extLst>
       <p:ext uri="{BB962C8B-B14F-4D97-AF65-F5344CB8AC3E}">
         <p14:creationId xmlns:p14="http://schemas.microsoft.com/office/powerpoint/2010/main" val="646102271"/>
-      </p:ext>
-    </p:extLst>
-  </p:cSld>
-  <p:clrMapOvr>
-    <a:masterClrMapping/>
-  </p:clrMapOvr>
-</p:sld>
-</file>
-
-<file path=ppt/slides/slide27.xml><?xml version="1.0" encoding="utf-8"?>
-<p:sld xmlns:a="http://schemas.openxmlformats.org/drawingml/2006/main" xmlns:r="http://schemas.openxmlformats.org/officeDocument/2006/relationships" xmlns:p="http://schemas.openxmlformats.org/presentationml/2006/main">
-  <p:cSld>
-    <p:spTree>
-      <p:nvGrpSpPr>
-        <p:cNvPr id="1" name=""/>
-        <p:cNvGrpSpPr/>
-        <p:nvPr/>
-      </p:nvGrpSpPr>
-      <p:grpSpPr>
-        <a:xfrm>
-          <a:off x="0" y="0"/>
-          <a:ext cx="0" cy="0"/>
-          <a:chOff x="0" y="0"/>
-          <a:chExt cx="0" cy="0"/>
-        </a:xfrm>
-      </p:grpSpPr>
-      <p:sp>
-        <p:nvSpPr>
-          <p:cNvPr id="2" name="TextBox 2">
-            <a:extLst>
-              <a:ext uri="{FF2B5EF4-FFF2-40B4-BE49-F238E27FC236}">
-                <a16:creationId xmlns:a16="http://schemas.microsoft.com/office/drawing/2014/main" id="{29B2CFD1-7A47-C52E-EC73-77871C16598C}"/>
-              </a:ext>
-            </a:extLst>
-          </p:cNvPr>
-          <p:cNvSpPr txBox="1"/>
-          <p:nvPr/>
-        </p:nvSpPr>
-        <p:spPr>
-          <a:xfrm>
-            <a:off x="2329883" y="3942080"/>
-            <a:ext cx="7419857" cy="4770537"/>
-          </a:xfrm>
-          <a:prstGeom prst="rect">
-            <a:avLst/>
-          </a:prstGeom>
-        </p:spPr>
-        <p:txBody>
-          <a:bodyPr lIns="0" tIns="0" rIns="0" bIns="0" rtlCol="0" anchor="t">
-            <a:spAutoFit/>
-          </a:bodyPr>
-          <a:lstStyle/>
-          <a:p>
-            <a:pPr>
-              <a:lnSpc>
-                <a:spcPts val="6159"/>
-              </a:lnSpc>
-            </a:pPr>
-            <a:r>
-              <a:rPr lang="en-US" sz="4399" dirty="0" err="1">
-                <a:solidFill>
-                  <a:srgbClr val="000000"/>
-                </a:solidFill>
-                <a:latin typeface="Catamaran Light"/>
-              </a:rPr>
-              <a:t>Mostrar</a:t>
-            </a:r>
-            <a:r>
-              <a:rPr lang="en-US" sz="4399" dirty="0">
-                <a:solidFill>
-                  <a:srgbClr val="000000"/>
-                </a:solidFill>
-                <a:latin typeface="Catamaran Light"/>
-              </a:rPr>
-              <a:t> </a:t>
-            </a:r>
-            <a:r>
-              <a:rPr lang="en-US" sz="4399" dirty="0" err="1">
-                <a:solidFill>
-                  <a:srgbClr val="000000"/>
-                </a:solidFill>
-                <a:latin typeface="Catamaran Light"/>
-              </a:rPr>
-              <a:t>en</a:t>
-            </a:r>
-            <a:r>
-              <a:rPr lang="en-US" sz="4399" dirty="0">
-                <a:solidFill>
-                  <a:srgbClr val="000000"/>
-                </a:solidFill>
-                <a:latin typeface="Catamaran Light"/>
-              </a:rPr>
-              <a:t> </a:t>
-            </a:r>
-            <a:r>
-              <a:rPr lang="en-US" sz="4399" dirty="0" err="1">
-                <a:solidFill>
-                  <a:srgbClr val="000000"/>
-                </a:solidFill>
-                <a:latin typeface="Catamaran Light"/>
-              </a:rPr>
-              <a:t>codigo</a:t>
-            </a:r>
-            <a:r>
-              <a:rPr lang="en-US" sz="4399" dirty="0">
-                <a:solidFill>
-                  <a:srgbClr val="000000"/>
-                </a:solidFill>
-                <a:latin typeface="Catamaran Light"/>
-              </a:rPr>
-              <a:t> </a:t>
-            </a:r>
-            <a:r>
-              <a:rPr lang="en-US" sz="4399" dirty="0" err="1">
-                <a:solidFill>
-                  <a:srgbClr val="000000"/>
-                </a:solidFill>
-                <a:latin typeface="Catamaran Light"/>
-              </a:rPr>
-              <a:t>el</a:t>
-            </a:r>
-            <a:r>
-              <a:rPr lang="en-US" sz="4399" dirty="0">
-                <a:solidFill>
-                  <a:srgbClr val="000000"/>
-                </a:solidFill>
-                <a:latin typeface="Catamaran Light"/>
-              </a:rPr>
-              <a:t> </a:t>
-            </a:r>
-            <a:r>
-              <a:rPr lang="en-US" sz="4399" dirty="0" err="1">
-                <a:solidFill>
-                  <a:srgbClr val="000000"/>
-                </a:solidFill>
-                <a:latin typeface="Catamaran Light"/>
-              </a:rPr>
-              <a:t>tema</a:t>
-            </a:r>
-            <a:r>
-              <a:rPr lang="en-US" sz="4399" dirty="0">
-                <a:solidFill>
-                  <a:srgbClr val="000000"/>
-                </a:solidFill>
-                <a:latin typeface="Catamaran Light"/>
-              </a:rPr>
-              <a:t> de </a:t>
-            </a:r>
-            <a:r>
-              <a:rPr lang="en-US" sz="4399" dirty="0" err="1">
-                <a:solidFill>
-                  <a:srgbClr val="000000"/>
-                </a:solidFill>
-                <a:latin typeface="Catamaran Light"/>
-              </a:rPr>
-              <a:t>publico</a:t>
-            </a:r>
-            <a:r>
-              <a:rPr lang="en-US" sz="4399" dirty="0">
-                <a:solidFill>
-                  <a:srgbClr val="000000"/>
-                </a:solidFill>
-                <a:latin typeface="Catamaran Light"/>
-              </a:rPr>
-              <a:t> y privado.</a:t>
-            </a:r>
-          </a:p>
-          <a:p>
-            <a:pPr>
-              <a:lnSpc>
-                <a:spcPts val="6159"/>
-              </a:lnSpc>
-            </a:pPr>
-            <a:endParaRPr lang="en-US" sz="4399" dirty="0">
-              <a:solidFill>
-                <a:srgbClr val="000000"/>
-              </a:solidFill>
-              <a:latin typeface="Catamaran Light"/>
-            </a:endParaRPr>
-          </a:p>
-          <a:p>
-            <a:pPr>
-              <a:lnSpc>
-                <a:spcPts val="6159"/>
-              </a:lnSpc>
-            </a:pPr>
-            <a:r>
-              <a:rPr lang="en-US" sz="4399" dirty="0">
-                <a:solidFill>
-                  <a:srgbClr val="000000"/>
-                </a:solidFill>
-                <a:latin typeface="Catamaran Light"/>
-              </a:rPr>
-              <a:t>Los </a:t>
-            </a:r>
-            <a:r>
-              <a:rPr lang="en-US" sz="4399" dirty="0" err="1">
-                <a:solidFill>
-                  <a:srgbClr val="000000"/>
-                </a:solidFill>
-                <a:latin typeface="Catamaran Light"/>
-              </a:rPr>
-              <a:t>metodos</a:t>
-            </a:r>
-            <a:r>
-              <a:rPr lang="en-US" sz="4399" dirty="0">
-                <a:solidFill>
-                  <a:srgbClr val="000000"/>
-                </a:solidFill>
-                <a:latin typeface="Catamaran Light"/>
-              </a:rPr>
-              <a:t> getter y setter</a:t>
-            </a:r>
-          </a:p>
-          <a:p>
-            <a:pPr>
-              <a:lnSpc>
-                <a:spcPts val="6159"/>
-              </a:lnSpc>
-            </a:pPr>
-            <a:endParaRPr lang="en-US" sz="4399" dirty="0">
-              <a:solidFill>
-                <a:srgbClr val="000000"/>
-              </a:solidFill>
-              <a:latin typeface="Catamaran Light"/>
-            </a:endParaRPr>
-          </a:p>
-          <a:p>
-            <a:pPr>
-              <a:lnSpc>
-                <a:spcPts val="6159"/>
-              </a:lnSpc>
-            </a:pPr>
-            <a:r>
-              <a:rPr lang="en-US" sz="4399" dirty="0">
-                <a:solidFill>
-                  <a:srgbClr val="000000"/>
-                </a:solidFill>
-                <a:latin typeface="Catamaran Light"/>
-              </a:rPr>
-              <a:t>Las </a:t>
-            </a:r>
-            <a:r>
-              <a:rPr lang="en-US" sz="4399" dirty="0" err="1">
-                <a:solidFill>
-                  <a:srgbClr val="000000"/>
-                </a:solidFill>
-                <a:latin typeface="Catamaran Light"/>
-              </a:rPr>
-              <a:t>propiedades</a:t>
-            </a:r>
-            <a:endParaRPr lang="en-US" sz="4399" dirty="0">
-              <a:solidFill>
-                <a:srgbClr val="000000"/>
-              </a:solidFill>
-              <a:latin typeface="Catamaran Light"/>
-            </a:endParaRPr>
-          </a:p>
-        </p:txBody>
-      </p:sp>
-    </p:spTree>
-    <p:extLst>
-      <p:ext uri="{BB962C8B-B14F-4D97-AF65-F5344CB8AC3E}">
-        <p14:creationId xmlns:p14="http://schemas.microsoft.com/office/powerpoint/2010/main" val="2023296319"/>
       </p:ext>
     </p:extLst>
   </p:cSld>
@@ -7895,7 +7462,7 @@
         <p:spPr>
           <a:xfrm>
             <a:off x="2329883" y="3942080"/>
-            <a:ext cx="7419857" cy="7155805"/>
+            <a:ext cx="7419857" cy="11131252"/>
           </a:xfrm>
           <a:prstGeom prst="rect">
             <a:avLst/>
@@ -7993,7 +7560,7 @@
                 </a:solidFill>
                 <a:latin typeface="Catamaran Light"/>
               </a:rPr>
-              <a:t>Sobrecarga</a:t>
+              <a:t>Uso</a:t>
             </a:r>
             <a:r>
               <a:rPr lang="en-US" sz="4399" dirty="0">
@@ -8002,6 +7569,47 @@
                 </a:solidFill>
                 <a:latin typeface="Catamaran Light"/>
               </a:rPr>
+              <a:t> de this</a:t>
+            </a:r>
+          </a:p>
+          <a:p>
+            <a:pPr>
+              <a:lnSpc>
+                <a:spcPts val="6159"/>
+              </a:lnSpc>
+            </a:pPr>
+            <a:r>
+              <a:rPr lang="en-US" sz="4399" dirty="0">
+                <a:solidFill>
+                  <a:srgbClr val="000000"/>
+                </a:solidFill>
+                <a:latin typeface="Catamaran Light"/>
+              </a:rPr>
+              <a:t>static</a:t>
+            </a:r>
+          </a:p>
+          <a:p>
+            <a:pPr>
+              <a:lnSpc>
+                <a:spcPts val="6159"/>
+              </a:lnSpc>
+            </a:pPr>
+            <a:r>
+              <a:rPr lang="en-US" sz="4399" dirty="0" err="1">
+                <a:solidFill>
+                  <a:srgbClr val="000000"/>
+                </a:solidFill>
+                <a:latin typeface="Catamaran Light"/>
+              </a:rPr>
+              <a:t>Miembros</a:t>
+            </a:r>
+            <a:r>
+              <a:rPr lang="en-US" sz="4399" dirty="0">
+                <a:solidFill>
+                  <a:srgbClr val="000000"/>
+                </a:solidFill>
+                <a:latin typeface="Catamaran Light"/>
+              </a:rPr>
               <a:t> de </a:t>
             </a:r>
             <a:r>
@@ -8011,7 +7619,29 @@
                 </a:solidFill>
                 <a:latin typeface="Catamaran Light"/>
               </a:rPr>
-              <a:t>metodos</a:t>
+              <a:t>instancia</a:t>
+            </a:r>
+            <a:endParaRPr lang="en-US" sz="4399" dirty="0">
+              <a:solidFill>
+                <a:srgbClr val="000000"/>
+              </a:solidFill>
+              <a:latin typeface="Catamaran Light"/>
+            </a:endParaRPr>
+          </a:p>
+          <a:p>
+            <a:pPr>
+              <a:lnSpc>
+                <a:spcPts val="6159"/>
+              </a:lnSpc>
+            </a:pPr>
+            <a:r>
+              <a:rPr lang="en-US" sz="4399" dirty="0" err="1">
+                <a:solidFill>
+                  <a:srgbClr val="000000"/>
+                </a:solidFill>
+                <a:latin typeface="Catamaran Light"/>
+              </a:rPr>
+              <a:t>Miembros</a:t>
             </a:r>
             <a:r>
               <a:rPr lang="en-US" sz="4399" dirty="0">
@@ -8020,8 +7650,23 @@
                 </a:solidFill>
                 <a:latin typeface="Catamaran Light"/>
               </a:rPr>
-              <a:t>.</a:t>
-            </a:r>
+              <a:t> de </a:t>
+            </a:r>
+            <a:r>
+              <a:rPr lang="en-US" sz="4399" dirty="0" err="1">
+                <a:solidFill>
+                  <a:srgbClr val="000000"/>
+                </a:solidFill>
+                <a:latin typeface="Catamaran Light"/>
+              </a:rPr>
+              <a:t>clase</a:t>
+            </a:r>
+            <a:endParaRPr lang="en-US" sz="4399" dirty="0">
+              <a:solidFill>
+                <a:srgbClr val="000000"/>
+              </a:solidFill>
+              <a:latin typeface="Catamaran Light"/>
+            </a:endParaRPr>
           </a:p>
           <a:p>
             <a:pPr>
@@ -8049,7 +7694,7 @@
                 </a:solidFill>
                 <a:latin typeface="Catamaran Light"/>
               </a:rPr>
-              <a:t>Clases</a:t>
+              <a:t>Sobrecarga</a:t>
             </a:r>
             <a:r>
               <a:rPr lang="en-US" sz="4399" dirty="0">
@@ -8058,7 +7703,7 @@
                 </a:solidFill>
                 <a:latin typeface="Catamaran Light"/>
               </a:rPr>
-              <a:t> </a:t>
+              <a:t> de </a:t>
             </a:r>
             <a:r>
               <a:rPr lang="en-US" sz="4399" dirty="0" err="1">
@@ -8067,7 +7712,7 @@
                 </a:solidFill>
                 <a:latin typeface="Catamaran Light"/>
               </a:rPr>
-              <a:t>abstractas</a:t>
+              <a:t>metodos</a:t>
             </a:r>
             <a:r>
               <a:rPr lang="en-US" sz="4399" dirty="0">
@@ -8105,7 +7750,7 @@
                 </a:solidFill>
                 <a:latin typeface="Catamaran Light"/>
               </a:rPr>
-              <a:t>Metodos</a:t>
+              <a:t>Clases</a:t>
             </a:r>
             <a:r>
               <a:rPr lang="en-US" sz="4399" dirty="0">
@@ -8123,7 +7768,7 @@
                 </a:solidFill>
                 <a:latin typeface="Catamaran Light"/>
               </a:rPr>
-              <a:t>abstractos</a:t>
+              <a:t>abstractas</a:t>
             </a:r>
             <a:r>
               <a:rPr lang="en-US" sz="4399" dirty="0">
@@ -8132,50 +7777,100 @@
                 </a:solidFill>
                 <a:latin typeface="Catamaran Light"/>
               </a:rPr>
-              <a:t>. </a:t>
-            </a:r>
-            <a:r>
-              <a:rPr lang="en-US" sz="4399" dirty="0" err="1">
-                <a:solidFill>
-                  <a:srgbClr val="000000"/>
-                </a:solidFill>
-                <a:latin typeface="Catamaran Light"/>
-              </a:rPr>
-              <a:t>Metodos</a:t>
-            </a:r>
-            <a:r>
-              <a:rPr lang="en-US" sz="4399" dirty="0">
-                <a:solidFill>
-                  <a:srgbClr val="000000"/>
-                </a:solidFill>
-                <a:latin typeface="Catamaran Light"/>
-              </a:rPr>
-              <a:t> </a:t>
-            </a:r>
-            <a:r>
-              <a:rPr lang="en-US" sz="4399" dirty="0" err="1">
-                <a:solidFill>
-                  <a:srgbClr val="000000"/>
-                </a:solidFill>
-                <a:latin typeface="Catamaran Light"/>
-              </a:rPr>
-              <a:t>virtuales</a:t>
-            </a:r>
-            <a:r>
-              <a:rPr lang="en-US" sz="4399">
-                <a:solidFill>
-                  <a:srgbClr val="000000"/>
-                </a:solidFill>
-                <a:latin typeface="Catamaran Light"/>
-              </a:rPr>
               <a:t>.</a:t>
             </a:r>
+          </a:p>
+          <a:p>
+            <a:pPr>
+              <a:lnSpc>
+                <a:spcPts val="6159"/>
+              </a:lnSpc>
+            </a:pPr>
             <a:endParaRPr lang="en-US" sz="4399" dirty="0">
               <a:solidFill>
                 <a:srgbClr val="000000"/>
               </a:solidFill>
               <a:latin typeface="Catamaran Light"/>
             </a:endParaRPr>
+          </a:p>
+          <a:p>
+            <a:pPr>
+              <a:lnSpc>
+                <a:spcPts val="6159"/>
+              </a:lnSpc>
+            </a:pPr>
+            <a:r>
+              <a:rPr lang="en-US" sz="4399" dirty="0" err="1">
+                <a:solidFill>
+                  <a:srgbClr val="000000"/>
+                </a:solidFill>
+                <a:latin typeface="Catamaran Light"/>
+              </a:rPr>
+              <a:t>Metodos</a:t>
+            </a:r>
+            <a:r>
+              <a:rPr lang="en-US" sz="4399" dirty="0">
+                <a:solidFill>
+                  <a:srgbClr val="000000"/>
+                </a:solidFill>
+                <a:latin typeface="Catamaran Light"/>
+              </a:rPr>
+              <a:t> </a:t>
+            </a:r>
+            <a:r>
+              <a:rPr lang="en-US" sz="4399" dirty="0" err="1">
+                <a:solidFill>
+                  <a:srgbClr val="000000"/>
+                </a:solidFill>
+                <a:latin typeface="Catamaran Light"/>
+              </a:rPr>
+              <a:t>abstractos</a:t>
+            </a:r>
+            <a:r>
+              <a:rPr lang="en-US" sz="4399" dirty="0">
+                <a:solidFill>
+                  <a:srgbClr val="000000"/>
+                </a:solidFill>
+                <a:latin typeface="Catamaran Light"/>
+              </a:rPr>
+              <a:t>. </a:t>
+            </a:r>
+            <a:r>
+              <a:rPr lang="en-US" sz="4399" dirty="0" err="1">
+                <a:solidFill>
+                  <a:srgbClr val="000000"/>
+                </a:solidFill>
+                <a:latin typeface="Catamaran Light"/>
+              </a:rPr>
+              <a:t>Metodos</a:t>
+            </a:r>
+            <a:r>
+              <a:rPr lang="en-US" sz="4399" dirty="0">
+                <a:solidFill>
+                  <a:srgbClr val="000000"/>
+                </a:solidFill>
+                <a:latin typeface="Catamaran Light"/>
+              </a:rPr>
+              <a:t> </a:t>
+            </a:r>
+            <a:r>
+              <a:rPr lang="en-US" sz="4399" dirty="0" err="1">
+                <a:solidFill>
+                  <a:srgbClr val="000000"/>
+                </a:solidFill>
+                <a:latin typeface="Catamaran Light"/>
+              </a:rPr>
+              <a:t>virtuales</a:t>
+            </a:r>
+            <a:r>
+              <a:rPr lang="en-US" sz="4399" dirty="0">
+                <a:solidFill>
+                  <a:srgbClr val="000000"/>
+                </a:solidFill>
+                <a:latin typeface="Catamaran Light"/>
+              </a:rPr>
+              <a:t>.</a:t>
+            </a:r>
           </a:p>
         </p:txBody>
       </p:sp>
@@ -14499,7 +14194,7 @@
         <p:spPr>
           <a:xfrm>
             <a:off x="8385351" y="2156777"/>
-            <a:ext cx="8604485" cy="5897245"/>
+            <a:ext cx="8604485" cy="5334794"/>
           </a:xfrm>
           <a:prstGeom prst="rect">
             <a:avLst/>
@@ -14517,13 +14212,76 @@
               </a:lnSpc>
             </a:pPr>
             <a:r>
-              <a:rPr lang="en-US" sz="3699">
+              <a:rPr lang="en-US" sz="3699" dirty="0" err="1">
                 <a:solidFill>
                   <a:srgbClr val="000000"/>
                 </a:solidFill>
                 <a:latin typeface="Catamaran"/>
               </a:rPr>
-              <a:t>Ejemplar concreto de una clase.</a:t>
+              <a:t>Ejemplar</a:t>
+            </a:r>
+            <a:r>
+              <a:rPr lang="en-US" sz="3699" dirty="0">
+                <a:solidFill>
+                  <a:srgbClr val="000000"/>
+                </a:solidFill>
+                <a:latin typeface="Catamaran"/>
+              </a:rPr>
+              <a:t> </a:t>
+            </a:r>
+            <a:r>
+              <a:rPr lang="en-US" sz="3699" dirty="0" err="1">
+                <a:solidFill>
+                  <a:srgbClr val="000000"/>
+                </a:solidFill>
+                <a:latin typeface="Catamaran"/>
+              </a:rPr>
+              <a:t>concreto</a:t>
+            </a:r>
+            <a:r>
+              <a:rPr lang="en-US" sz="3699" dirty="0">
+                <a:solidFill>
+                  <a:srgbClr val="000000"/>
+                </a:solidFill>
+                <a:latin typeface="Catamaran"/>
+              </a:rPr>
+              <a:t> de </a:t>
+            </a:r>
+            <a:r>
+              <a:rPr lang="en-US" sz="3699" dirty="0" err="1">
+                <a:solidFill>
+                  <a:srgbClr val="000000"/>
+                </a:solidFill>
+                <a:latin typeface="Catamaran"/>
+              </a:rPr>
+              <a:t>una</a:t>
+            </a:r>
+            <a:r>
+              <a:rPr lang="en-US" sz="3699" dirty="0">
+                <a:solidFill>
+                  <a:srgbClr val="000000"/>
+                </a:solidFill>
+                <a:latin typeface="Catamaran"/>
+              </a:rPr>
+              <a:t> </a:t>
+            </a:r>
+            <a:r>
+              <a:rPr lang="en-US" sz="3699" dirty="0" err="1">
+                <a:solidFill>
+                  <a:srgbClr val="000000"/>
+                </a:solidFill>
+                <a:latin typeface="Catamaran"/>
+              </a:rPr>
+              <a:t>clase</a:t>
+            </a:r>
+            <a:r>
+              <a:rPr lang="en-US" sz="3699" dirty="0">
+                <a:solidFill>
+                  <a:srgbClr val="000000"/>
+                </a:solidFill>
+                <a:latin typeface="Catamaran"/>
+              </a:rPr>
+              <a:t>.</a:t>
             </a:r>
           </a:p>
           <a:p>
@@ -14532,7 +14290,7 @@
                 <a:spcPts val="5179"/>
               </a:lnSpc>
             </a:pPr>
-            <a:endParaRPr lang="en-US" sz="3699">
+            <a:endParaRPr lang="en-US" sz="3699" dirty="0">
               <a:solidFill>
                 <a:srgbClr val="000000"/>
               </a:solidFill>
@@ -14546,13 +14304,40 @@
               </a:lnSpc>
             </a:pPr>
             <a:r>
-              <a:rPr lang="en-US" sz="3699">
-                <a:solidFill>
-                  <a:srgbClr val="000000"/>
-                </a:solidFill>
-                <a:latin typeface="Catamaran Light"/>
-              </a:rPr>
-              <a:t>Estructura que define el comportamiento y las características que los objetos creados a partir de ella tendrán. </a:t>
+              <a:rPr lang="en-US" sz="3699" dirty="0">
+                <a:solidFill>
+                  <a:srgbClr val="000000"/>
+                </a:solidFill>
+                <a:latin typeface="Catamaran Light"/>
+              </a:rPr>
+              <a:t>E</a:t>
+            </a:r>
+            <a:r>
+              <a:rPr lang="es-ES" sz="3699" dirty="0" err="1">
+                <a:solidFill>
+                  <a:srgbClr val="000000"/>
+                </a:solidFill>
+                <a:latin typeface="Catamaran Light"/>
+              </a:rPr>
+              <a:t>ntidad</a:t>
+            </a:r>
+            <a:r>
+              <a:rPr lang="es-ES" sz="3699" dirty="0">
+                <a:solidFill>
+                  <a:srgbClr val="000000"/>
+                </a:solidFill>
+                <a:latin typeface="Catamaran Light"/>
+              </a:rPr>
+              <a:t> que tiene un estado (datos) y un comportamiento (métodos) asociados.</a:t>
+            </a:r>
+            <a:r>
+              <a:rPr lang="en-US" sz="3699" dirty="0">
+                <a:solidFill>
+                  <a:srgbClr val="000000"/>
+                </a:solidFill>
+                <a:latin typeface="Catamaran Light"/>
+              </a:rPr>
+              <a:t> </a:t>
             </a:r>
           </a:p>
           <a:p>
@@ -14561,7 +14346,7 @@
                 <a:spcPts val="5179"/>
               </a:lnSpc>
             </a:pPr>
-            <a:endParaRPr lang="en-US" sz="3699">
+            <a:endParaRPr lang="en-US" sz="3699" dirty="0">
               <a:solidFill>
                 <a:srgbClr val="000000"/>
               </a:solidFill>
@@ -14575,13 +14360,166 @@
               </a:lnSpc>
             </a:pPr>
             <a:r>
-              <a:rPr lang="en-US" sz="3699">
-                <a:solidFill>
-                  <a:srgbClr val="000000"/>
-                </a:solidFill>
-                <a:latin typeface="Catamaran Light"/>
-              </a:rPr>
-              <a:t>Conjunto de datos y métodos que trabajan juntos para representar un concepto o entidad en el mundo real.</a:t>
+              <a:rPr lang="en-US" sz="3699" dirty="0" err="1">
+                <a:solidFill>
+                  <a:srgbClr val="000000"/>
+                </a:solidFill>
+                <a:latin typeface="Catamaran Light"/>
+              </a:rPr>
+              <a:t>Esos</a:t>
+            </a:r>
+            <a:r>
+              <a:rPr lang="en-US" sz="3699" dirty="0">
+                <a:solidFill>
+                  <a:srgbClr val="000000"/>
+                </a:solidFill>
+                <a:latin typeface="Catamaran Light"/>
+              </a:rPr>
+              <a:t> </a:t>
+            </a:r>
+            <a:r>
+              <a:rPr lang="en-US" sz="3699" dirty="0" err="1">
+                <a:solidFill>
+                  <a:srgbClr val="000000"/>
+                </a:solidFill>
+                <a:latin typeface="Catamaran Light"/>
+              </a:rPr>
+              <a:t>datos</a:t>
+            </a:r>
+            <a:r>
+              <a:rPr lang="en-US" sz="3699" dirty="0">
+                <a:solidFill>
+                  <a:srgbClr val="000000"/>
+                </a:solidFill>
+                <a:latin typeface="Catamaran Light"/>
+              </a:rPr>
+              <a:t> y </a:t>
+            </a:r>
+            <a:r>
+              <a:rPr lang="en-US" sz="3699" dirty="0" err="1">
+                <a:solidFill>
+                  <a:srgbClr val="000000"/>
+                </a:solidFill>
+                <a:latin typeface="Catamaran Light"/>
+              </a:rPr>
+              <a:t>métodos</a:t>
+            </a:r>
+            <a:r>
+              <a:rPr lang="en-US" sz="3699" dirty="0">
+                <a:solidFill>
+                  <a:srgbClr val="000000"/>
+                </a:solidFill>
+                <a:latin typeface="Catamaran Light"/>
+              </a:rPr>
+              <a:t>, </a:t>
+            </a:r>
+            <a:r>
+              <a:rPr lang="en-US" sz="3699" dirty="0" err="1">
+                <a:solidFill>
+                  <a:srgbClr val="000000"/>
+                </a:solidFill>
+                <a:latin typeface="Catamaran Light"/>
+              </a:rPr>
+              <a:t>corresponden</a:t>
+            </a:r>
+            <a:r>
+              <a:rPr lang="en-US" sz="3699" dirty="0">
+                <a:solidFill>
+                  <a:srgbClr val="000000"/>
+                </a:solidFill>
+                <a:latin typeface="Catamaran Light"/>
+              </a:rPr>
+              <a:t> a </a:t>
+            </a:r>
+            <a:r>
+              <a:rPr lang="en-US" sz="3699" dirty="0" err="1">
+                <a:solidFill>
+                  <a:srgbClr val="000000"/>
+                </a:solidFill>
+                <a:latin typeface="Catamaran Light"/>
+              </a:rPr>
+              <a:t>los</a:t>
+            </a:r>
+            <a:r>
+              <a:rPr lang="en-US" sz="3699" dirty="0">
+                <a:solidFill>
+                  <a:srgbClr val="000000"/>
+                </a:solidFill>
+                <a:latin typeface="Catamaran Light"/>
+              </a:rPr>
+              <a:t> que se </a:t>
+            </a:r>
+            <a:r>
+              <a:rPr lang="en-US" sz="3699" dirty="0" err="1">
+                <a:solidFill>
+                  <a:srgbClr val="000000"/>
+                </a:solidFill>
+                <a:latin typeface="Catamaran Light"/>
+              </a:rPr>
+              <a:t>definieron</a:t>
+            </a:r>
+            <a:r>
+              <a:rPr lang="en-US" sz="3699" dirty="0">
+                <a:solidFill>
+                  <a:srgbClr val="000000"/>
+                </a:solidFill>
+                <a:latin typeface="Catamaran Light"/>
+              </a:rPr>
+              <a:t> </a:t>
+            </a:r>
+            <a:r>
+              <a:rPr lang="en-US" sz="3699" dirty="0" err="1">
+                <a:solidFill>
+                  <a:srgbClr val="000000"/>
+                </a:solidFill>
+                <a:latin typeface="Catamaran Light"/>
+              </a:rPr>
+              <a:t>en</a:t>
+            </a:r>
+            <a:r>
+              <a:rPr lang="en-US" sz="3699" dirty="0">
+                <a:solidFill>
+                  <a:srgbClr val="000000"/>
+                </a:solidFill>
+                <a:latin typeface="Catamaran Light"/>
+              </a:rPr>
+              <a:t> la </a:t>
+            </a:r>
+            <a:r>
+              <a:rPr lang="en-US" sz="3699" dirty="0" err="1">
+                <a:solidFill>
+                  <a:srgbClr val="000000"/>
+                </a:solidFill>
+                <a:latin typeface="Catamaran Light"/>
+              </a:rPr>
+              <a:t>clase</a:t>
+            </a:r>
+            <a:r>
+              <a:rPr lang="en-US" sz="3699" dirty="0">
+                <a:solidFill>
+                  <a:srgbClr val="000000"/>
+                </a:solidFill>
+                <a:latin typeface="Catamaran Light"/>
+              </a:rPr>
+              <a:t> a la que </a:t>
+            </a:r>
+            <a:r>
+              <a:rPr lang="en-US" sz="3699" dirty="0" err="1">
+                <a:solidFill>
+                  <a:srgbClr val="000000"/>
+                </a:solidFill>
+                <a:latin typeface="Catamaran Light"/>
+              </a:rPr>
+              <a:t>pertenecen</a:t>
+            </a:r>
+            <a:r>
+              <a:rPr lang="en-US" sz="3699" dirty="0">
+                <a:solidFill>
+                  <a:srgbClr val="000000"/>
+                </a:solidFill>
+                <a:latin typeface="Catamaran Light"/>
+              </a:rPr>
+              <a:t>.</a:t>
             </a:r>
           </a:p>
         </p:txBody>

</xml_diff>

<commit_message>
portada libro en la presentacion
</commit_message>
<xml_diff>
--- a/Presentacion POO APP.pptx
+++ b/Presentacion POO APP.pptx
@@ -26,48 +26,49 @@
     <p:sldId id="285" r:id="rId20"/>
     <p:sldId id="286" r:id="rId21"/>
     <p:sldId id="287" r:id="rId22"/>
-    <p:sldId id="289" r:id="rId23"/>
-    <p:sldId id="282" r:id="rId24"/>
-    <p:sldId id="303" r:id="rId25"/>
-    <p:sldId id="305" r:id="rId26"/>
-    <p:sldId id="292" r:id="rId27"/>
-    <p:sldId id="291" r:id="rId28"/>
-    <p:sldId id="297" r:id="rId29"/>
-    <p:sldId id="298" r:id="rId30"/>
-    <p:sldId id="299" r:id="rId31"/>
-    <p:sldId id="300" r:id="rId32"/>
-    <p:sldId id="283" r:id="rId33"/>
-    <p:sldId id="284" r:id="rId34"/>
-    <p:sldId id="271" r:id="rId35"/>
-    <p:sldId id="272" r:id="rId36"/>
-    <p:sldId id="273" r:id="rId37"/>
-    <p:sldId id="274" r:id="rId38"/>
-    <p:sldId id="275" r:id="rId39"/>
-    <p:sldId id="276" r:id="rId40"/>
-    <p:sldId id="277" r:id="rId41"/>
-    <p:sldId id="278" r:id="rId42"/>
-    <p:sldId id="279" r:id="rId43"/>
-    <p:sldId id="280" r:id="rId44"/>
-    <p:sldId id="281" r:id="rId45"/>
+    <p:sldId id="307" r:id="rId23"/>
+    <p:sldId id="289" r:id="rId24"/>
+    <p:sldId id="282" r:id="rId25"/>
+    <p:sldId id="303" r:id="rId26"/>
+    <p:sldId id="305" r:id="rId27"/>
+    <p:sldId id="292" r:id="rId28"/>
+    <p:sldId id="291" r:id="rId29"/>
+    <p:sldId id="297" r:id="rId30"/>
+    <p:sldId id="298" r:id="rId31"/>
+    <p:sldId id="299" r:id="rId32"/>
+    <p:sldId id="300" r:id="rId33"/>
+    <p:sldId id="283" r:id="rId34"/>
+    <p:sldId id="284" r:id="rId35"/>
+    <p:sldId id="271" r:id="rId36"/>
+    <p:sldId id="272" r:id="rId37"/>
+    <p:sldId id="273" r:id="rId38"/>
+    <p:sldId id="274" r:id="rId39"/>
+    <p:sldId id="275" r:id="rId40"/>
+    <p:sldId id="276" r:id="rId41"/>
+    <p:sldId id="277" r:id="rId42"/>
+    <p:sldId id="278" r:id="rId43"/>
+    <p:sldId id="279" r:id="rId44"/>
+    <p:sldId id="280" r:id="rId45"/>
+    <p:sldId id="281" r:id="rId46"/>
   </p:sldIdLst>
   <p:sldSz cx="18288000" cy="10287000"/>
   <p:notesSz cx="6858000" cy="9144000"/>
   <p:embeddedFontLst>
     <p:embeddedFont>
       <p:font typeface="Catamaran" panose="020B0604020202020204" charset="0"/>
-      <p:regular r:id="rId46"/>
+      <p:regular r:id="rId47"/>
     </p:embeddedFont>
     <p:embeddedFont>
       <p:font typeface="Catamaran Bold" panose="020B0604020202020204" charset="0"/>
-      <p:regular r:id="rId47"/>
+      <p:regular r:id="rId48"/>
     </p:embeddedFont>
     <p:embeddedFont>
       <p:font typeface="Catamaran Light" panose="020B0604020202020204" charset="0"/>
-      <p:regular r:id="rId48"/>
+      <p:regular r:id="rId49"/>
     </p:embeddedFont>
     <p:embeddedFont>
       <p:font typeface="Lovelo" panose="020B0604020202020204" charset="0"/>
-      <p:regular r:id="rId49"/>
+      <p:regular r:id="rId50"/>
     </p:embeddedFont>
   </p:embeddedFontLst>
   <p:defaultTextStyle>
@@ -364,7 +365,7 @@
             <a:fld id="{1D8BD707-D9CF-40AE-B4C6-C98DA3205C09}" type="datetimeFigureOut">
               <a:rPr lang="en-US" smtClean="0"/>
               <a:pPr/>
-              <a:t>4/3/2024</a:t>
+              <a:t>4/8/2024</a:t>
             </a:fld>
             <a:endParaRPr lang="en-US"/>
           </a:p>
@@ -529,7 +530,7 @@
             <a:fld id="{1D8BD707-D9CF-40AE-B4C6-C98DA3205C09}" type="datetimeFigureOut">
               <a:rPr lang="en-US" smtClean="0"/>
               <a:pPr/>
-              <a:t>4/3/2024</a:t>
+              <a:t>4/8/2024</a:t>
             </a:fld>
             <a:endParaRPr lang="en-US"/>
           </a:p>
@@ -704,7 +705,7 @@
             <a:fld id="{1D8BD707-D9CF-40AE-B4C6-C98DA3205C09}" type="datetimeFigureOut">
               <a:rPr lang="en-US" smtClean="0"/>
               <a:pPr/>
-              <a:t>4/3/2024</a:t>
+              <a:t>4/8/2024</a:t>
             </a:fld>
             <a:endParaRPr lang="en-US"/>
           </a:p>
@@ -869,7 +870,7 @@
             <a:fld id="{1D8BD707-D9CF-40AE-B4C6-C98DA3205C09}" type="datetimeFigureOut">
               <a:rPr lang="en-US" smtClean="0"/>
               <a:pPr/>
-              <a:t>4/3/2024</a:t>
+              <a:t>4/8/2024</a:t>
             </a:fld>
             <a:endParaRPr lang="en-US"/>
           </a:p>
@@ -1111,7 +1112,7 @@
             <a:fld id="{1D8BD707-D9CF-40AE-B4C6-C98DA3205C09}" type="datetimeFigureOut">
               <a:rPr lang="en-US" smtClean="0"/>
               <a:pPr/>
-              <a:t>4/3/2024</a:t>
+              <a:t>4/8/2024</a:t>
             </a:fld>
             <a:endParaRPr lang="en-US"/>
           </a:p>
@@ -1393,7 +1394,7 @@
             <a:fld id="{1D8BD707-D9CF-40AE-B4C6-C98DA3205C09}" type="datetimeFigureOut">
               <a:rPr lang="en-US" smtClean="0"/>
               <a:pPr/>
-              <a:t>4/3/2024</a:t>
+              <a:t>4/8/2024</a:t>
             </a:fld>
             <a:endParaRPr lang="en-US"/>
           </a:p>
@@ -1809,7 +1810,7 @@
             <a:fld id="{1D8BD707-D9CF-40AE-B4C6-C98DA3205C09}" type="datetimeFigureOut">
               <a:rPr lang="en-US" smtClean="0"/>
               <a:pPr/>
-              <a:t>4/3/2024</a:t>
+              <a:t>4/8/2024</a:t>
             </a:fld>
             <a:endParaRPr lang="en-US"/>
           </a:p>
@@ -1923,7 +1924,7 @@
             <a:fld id="{1D8BD707-D9CF-40AE-B4C6-C98DA3205C09}" type="datetimeFigureOut">
               <a:rPr lang="en-US" smtClean="0"/>
               <a:pPr/>
-              <a:t>4/3/2024</a:t>
+              <a:t>4/8/2024</a:t>
             </a:fld>
             <a:endParaRPr lang="en-US"/>
           </a:p>
@@ -2015,7 +2016,7 @@
             <a:fld id="{1D8BD707-D9CF-40AE-B4C6-C98DA3205C09}" type="datetimeFigureOut">
               <a:rPr lang="en-US" smtClean="0"/>
               <a:pPr/>
-              <a:t>4/3/2024</a:t>
+              <a:t>4/8/2024</a:t>
             </a:fld>
             <a:endParaRPr lang="en-US"/>
           </a:p>
@@ -2287,7 +2288,7 @@
             <a:fld id="{1D8BD707-D9CF-40AE-B4C6-C98DA3205C09}" type="datetimeFigureOut">
               <a:rPr lang="en-US" smtClean="0"/>
               <a:pPr/>
-              <a:t>4/3/2024</a:t>
+              <a:t>4/8/2024</a:t>
             </a:fld>
             <a:endParaRPr lang="en-US"/>
           </a:p>
@@ -2536,7 +2537,7 @@
             <a:fld id="{1D8BD707-D9CF-40AE-B4C6-C98DA3205C09}" type="datetimeFigureOut">
               <a:rPr lang="en-US" smtClean="0"/>
               <a:pPr/>
-              <a:t>4/3/2024</a:t>
+              <a:t>4/8/2024</a:t>
             </a:fld>
             <a:endParaRPr lang="en-US"/>
           </a:p>
@@ -2744,7 +2745,7 @@
             <a:fld id="{1D8BD707-D9CF-40AE-B4C6-C98DA3205C09}" type="datetimeFigureOut">
               <a:rPr lang="en-US" smtClean="0"/>
               <a:pPr/>
-              <a:t>4/3/2024</a:t>
+              <a:t>4/8/2024</a:t>
             </a:fld>
             <a:endParaRPr lang="en-US"/>
           </a:p>
@@ -5265,6 +5266,260 @@
           <a:chExt cx="0" cy="0"/>
         </a:xfrm>
       </p:grpSpPr>
+      <p:pic>
+        <p:nvPicPr>
+          <p:cNvPr id="2" name="Picture 6">
+            <a:extLst>
+              <a:ext uri="{FF2B5EF4-FFF2-40B4-BE49-F238E27FC236}">
+                <a16:creationId xmlns:a16="http://schemas.microsoft.com/office/drawing/2014/main" id="{EF884D78-11C4-2FFC-65FD-72A81DEF513E}"/>
+              </a:ext>
+            </a:extLst>
+          </p:cNvPr>
+          <p:cNvPicPr>
+            <a:picLocks noChangeAspect="1" noChangeArrowheads="1"/>
+          </p:cNvPicPr>
+          <p:nvPr/>
+        </p:nvPicPr>
+        <p:blipFill>
+          <a:blip r:embed="rId2">
+            <a:extLst>
+              <a:ext uri="{28A0092B-C50C-407E-A947-70E740481C1C}">
+                <a14:useLocalDpi xmlns:a14="http://schemas.microsoft.com/office/drawing/2010/main" val="0"/>
+              </a:ext>
+            </a:extLst>
+          </a:blip>
+          <a:stretch>
+            <a:fillRect/>
+          </a:stretch>
+        </p:blipFill>
+        <p:spPr bwMode="auto">
+          <a:xfrm>
+            <a:off x="4937380" y="713271"/>
+            <a:ext cx="8413245" cy="8413245"/>
+          </a:xfrm>
+          <a:prstGeom prst="rect">
+            <a:avLst/>
+          </a:prstGeom>
+          <a:noFill/>
+          <a:extLst>
+            <a:ext uri="{909E8E84-426E-40DD-AFC4-6F175D3DCCD1}">
+              <a14:hiddenFill xmlns:a14="http://schemas.microsoft.com/office/drawing/2010/main">
+                <a:solidFill>
+                  <a:srgbClr val="FFFFFF"/>
+                </a:solidFill>
+              </a14:hiddenFill>
+            </a:ext>
+          </a:extLst>
+        </p:spPr>
+      </p:pic>
+      <p:sp>
+        <p:nvSpPr>
+          <p:cNvPr id="10" name="TextBox 9">
+            <a:extLst>
+              <a:ext uri="{FF2B5EF4-FFF2-40B4-BE49-F238E27FC236}">
+                <a16:creationId xmlns:a16="http://schemas.microsoft.com/office/drawing/2014/main" id="{E8664FEF-DB9B-6176-EB47-552ED0DC32F9}"/>
+              </a:ext>
+            </a:extLst>
+          </p:cNvPr>
+          <p:cNvSpPr txBox="1"/>
+          <p:nvPr/>
+        </p:nvSpPr>
+        <p:spPr>
+          <a:xfrm>
+            <a:off x="1417955" y="7232149"/>
+            <a:ext cx="3504677" cy="769441"/>
+          </a:xfrm>
+          <a:prstGeom prst="rect">
+            <a:avLst/>
+          </a:prstGeom>
+          <a:noFill/>
+        </p:spPr>
+        <p:txBody>
+          <a:bodyPr wrap="none" rtlCol="0">
+            <a:spAutoFit/>
+          </a:bodyPr>
+          <a:lstStyle/>
+          <a:p>
+            <a:r>
+              <a:rPr lang="en-US" sz="4400" dirty="0"/>
+              <a:t>La </a:t>
+            </a:r>
+            <a:r>
+              <a:rPr lang="en-US" sz="4400" dirty="0" err="1"/>
+              <a:t>Abstracción</a:t>
+            </a:r>
+            <a:endParaRPr lang="en-US" sz="4400" dirty="0"/>
+          </a:p>
+        </p:txBody>
+      </p:sp>
+      <p:sp>
+        <p:nvSpPr>
+          <p:cNvPr id="11" name="Arrow: Right 10">
+            <a:extLst>
+              <a:ext uri="{FF2B5EF4-FFF2-40B4-BE49-F238E27FC236}">
+                <a16:creationId xmlns:a16="http://schemas.microsoft.com/office/drawing/2014/main" id="{ABCA33D4-0BF6-BD4D-ECD9-5B37C890A7CA}"/>
+              </a:ext>
+            </a:extLst>
+          </p:cNvPr>
+          <p:cNvSpPr/>
+          <p:nvPr/>
+        </p:nvSpPr>
+        <p:spPr>
+          <a:xfrm rot="19964366">
+            <a:off x="4956158" y="6903203"/>
+            <a:ext cx="1518424" cy="378756"/>
+          </a:xfrm>
+          <a:prstGeom prst="rightArrow">
+            <a:avLst>
+              <a:gd name="adj1" fmla="val 50000"/>
+              <a:gd name="adj2" fmla="val 58586"/>
+            </a:avLst>
+          </a:prstGeom>
+          <a:solidFill>
+            <a:schemeClr val="tx1"/>
+          </a:solidFill>
+        </p:spPr>
+        <p:style>
+          <a:lnRef idx="2">
+            <a:schemeClr val="accent1">
+              <a:shade val="15000"/>
+            </a:schemeClr>
+          </a:lnRef>
+          <a:fillRef idx="1">
+            <a:schemeClr val="accent1"/>
+          </a:fillRef>
+          <a:effectRef idx="0">
+            <a:schemeClr val="accent1"/>
+          </a:effectRef>
+          <a:fontRef idx="minor">
+            <a:schemeClr val="lt1"/>
+          </a:fontRef>
+        </p:style>
+        <p:txBody>
+          <a:bodyPr rtlCol="0" anchor="ctr"/>
+          <a:lstStyle/>
+          <a:p>
+            <a:pPr algn="ctr"/>
+            <a:endParaRPr lang="en-US"/>
+          </a:p>
+        </p:txBody>
+      </p:sp>
+      <p:cxnSp>
+        <p:nvCxnSpPr>
+          <p:cNvPr id="17" name="Straight Connector 16">
+            <a:extLst>
+              <a:ext uri="{FF2B5EF4-FFF2-40B4-BE49-F238E27FC236}">
+                <a16:creationId xmlns:a16="http://schemas.microsoft.com/office/drawing/2014/main" id="{4000B110-0647-06B9-F1F9-B533CA170784}"/>
+              </a:ext>
+            </a:extLst>
+          </p:cNvPr>
+          <p:cNvCxnSpPr>
+            <a:cxnSpLocks/>
+          </p:cNvCxnSpPr>
+          <p:nvPr/>
+        </p:nvCxnSpPr>
+        <p:spPr>
+          <a:xfrm>
+            <a:off x="6513872" y="6034857"/>
+            <a:ext cx="2880851" cy="645133"/>
+          </a:xfrm>
+          <a:prstGeom prst="line">
+            <a:avLst/>
+          </a:prstGeom>
+          <a:ln w="73025">
+            <a:solidFill>
+              <a:schemeClr val="tx1"/>
+            </a:solidFill>
+          </a:ln>
+        </p:spPr>
+        <p:style>
+          <a:lnRef idx="1">
+            <a:schemeClr val="accent1"/>
+          </a:lnRef>
+          <a:fillRef idx="0">
+            <a:schemeClr val="accent1"/>
+          </a:fillRef>
+          <a:effectRef idx="0">
+            <a:schemeClr val="accent1"/>
+          </a:effectRef>
+          <a:fontRef idx="minor">
+            <a:schemeClr val="tx1"/>
+          </a:fontRef>
+        </p:style>
+      </p:cxnSp>
+      <p:cxnSp>
+        <p:nvCxnSpPr>
+          <p:cNvPr id="21" name="Straight Connector 20">
+            <a:extLst>
+              <a:ext uri="{FF2B5EF4-FFF2-40B4-BE49-F238E27FC236}">
+                <a16:creationId xmlns:a16="http://schemas.microsoft.com/office/drawing/2014/main" id="{42398AD5-7054-7A05-E2A2-D9B4F46C2EAA}"/>
+              </a:ext>
+            </a:extLst>
+          </p:cNvPr>
+          <p:cNvCxnSpPr>
+            <a:cxnSpLocks/>
+          </p:cNvCxnSpPr>
+          <p:nvPr/>
+        </p:nvCxnSpPr>
+        <p:spPr>
+          <a:xfrm flipV="1">
+            <a:off x="6513872" y="6048222"/>
+            <a:ext cx="2695996" cy="528266"/>
+          </a:xfrm>
+          <a:prstGeom prst="line">
+            <a:avLst/>
+          </a:prstGeom>
+          <a:ln w="73025">
+            <a:solidFill>
+              <a:schemeClr val="tx1"/>
+            </a:solidFill>
+          </a:ln>
+        </p:spPr>
+        <p:style>
+          <a:lnRef idx="1">
+            <a:schemeClr val="accent1"/>
+          </a:lnRef>
+          <a:fillRef idx="0">
+            <a:schemeClr val="accent1"/>
+          </a:fillRef>
+          <a:effectRef idx="0">
+            <a:schemeClr val="accent1"/>
+          </a:effectRef>
+          <a:fontRef idx="minor">
+            <a:schemeClr val="tx1"/>
+          </a:fontRef>
+        </p:style>
+      </p:cxnSp>
+    </p:spTree>
+    <p:extLst>
+      <p:ext uri="{BB962C8B-B14F-4D97-AF65-F5344CB8AC3E}">
+        <p14:creationId xmlns:p14="http://schemas.microsoft.com/office/powerpoint/2010/main" val="2543209511"/>
+      </p:ext>
+    </p:extLst>
+  </p:cSld>
+  <p:clrMapOvr>
+    <a:masterClrMapping/>
+  </p:clrMapOvr>
+</p:sld>
+</file>
+
+<file path=ppt/slides/slide23.xml><?xml version="1.0" encoding="utf-8"?>
+<p:sld xmlns:a="http://schemas.openxmlformats.org/drawingml/2006/main" xmlns:r="http://schemas.openxmlformats.org/officeDocument/2006/relationships" xmlns:p="http://schemas.openxmlformats.org/presentationml/2006/main">
+  <p:cSld>
+    <p:spTree>
+      <p:nvGrpSpPr>
+        <p:cNvPr id="1" name=""/>
+        <p:cNvGrpSpPr/>
+        <p:nvPr/>
+      </p:nvGrpSpPr>
+      <p:grpSpPr>
+        <a:xfrm>
+          <a:off x="0" y="0"/>
+          <a:ext cx="0" cy="0"/>
+          <a:chOff x="0" y="0"/>
+          <a:chExt cx="0" cy="0"/>
+        </a:xfrm>
+      </p:grpSpPr>
       <p:sp>
         <p:nvSpPr>
           <p:cNvPr id="2" name="TextBox 2"/>
@@ -5334,7 +5589,7 @@
 </p:sld>
 </file>
 
-<file path=ppt/slides/slide23.xml><?xml version="1.0" encoding="utf-8"?>
+<file path=ppt/slides/slide24.xml><?xml version="1.0" encoding="utf-8"?>
 <p:sld xmlns:a="http://schemas.openxmlformats.org/drawingml/2006/main" xmlns:r="http://schemas.openxmlformats.org/officeDocument/2006/relationships" xmlns:p="http://schemas.openxmlformats.org/presentationml/2006/main">
   <p:cSld>
     <p:bg>
@@ -5662,80 +5917,6 @@
 </p:sld>
 </file>
 
-<file path=ppt/slides/slide24.xml><?xml version="1.0" encoding="utf-8"?>
-<p:sld xmlns:a="http://schemas.openxmlformats.org/drawingml/2006/main" xmlns:r="http://schemas.openxmlformats.org/officeDocument/2006/relationships" xmlns:p="http://schemas.openxmlformats.org/presentationml/2006/main">
-  <p:cSld>
-    <p:spTree>
-      <p:nvGrpSpPr>
-        <p:cNvPr id="1" name=""/>
-        <p:cNvGrpSpPr/>
-        <p:nvPr/>
-      </p:nvGrpSpPr>
-      <p:grpSpPr>
-        <a:xfrm>
-          <a:off x="0" y="0"/>
-          <a:ext cx="0" cy="0"/>
-          <a:chOff x="0" y="0"/>
-          <a:chExt cx="0" cy="0"/>
-        </a:xfrm>
-      </p:grpSpPr>
-      <p:sp>
-        <p:nvSpPr>
-          <p:cNvPr id="2" name="TextBox 2"/>
-          <p:cNvSpPr txBox="1"/>
-          <p:nvPr/>
-        </p:nvSpPr>
-        <p:spPr>
-          <a:xfrm>
-            <a:off x="4847000" y="4305300"/>
-            <a:ext cx="8593999" cy="1384674"/>
-          </a:xfrm>
-          <a:prstGeom prst="rect">
-            <a:avLst/>
-          </a:prstGeom>
-        </p:spPr>
-        <p:txBody>
-          <a:bodyPr wrap="square" lIns="0" tIns="0" rIns="0" bIns="0" rtlCol="0" anchor="t">
-            <a:spAutoFit/>
-          </a:bodyPr>
-          <a:lstStyle/>
-          <a:p>
-            <a:pPr algn="ctr">
-              <a:lnSpc>
-                <a:spcPts val="11000"/>
-              </a:lnSpc>
-            </a:pPr>
-            <a:r>
-              <a:rPr lang="en-US" sz="9000" dirty="0" err="1">
-                <a:solidFill>
-                  <a:srgbClr val="000000"/>
-                </a:solidFill>
-                <a:latin typeface="Lovelo"/>
-              </a:rPr>
-              <a:t>agrupar</a:t>
-            </a:r>
-            <a:endParaRPr lang="en-US" sz="9000" dirty="0">
-              <a:solidFill>
-                <a:srgbClr val="000000"/>
-              </a:solidFill>
-              <a:latin typeface="Lovelo"/>
-            </a:endParaRPr>
-          </a:p>
-        </p:txBody>
-      </p:sp>
-    </p:spTree>
-    <p:extLst>
-      <p:ext uri="{BB962C8B-B14F-4D97-AF65-F5344CB8AC3E}">
-        <p14:creationId xmlns:p14="http://schemas.microsoft.com/office/powerpoint/2010/main" val="122220413"/>
-      </p:ext>
-    </p:extLst>
-  </p:cSld>
-  <p:clrMapOvr>
-    <a:masterClrMapping/>
-  </p:clrMapOvr>
-</p:sld>
-</file>
-
 <file path=ppt/slides/slide25.xml><?xml version="1.0" encoding="utf-8"?>
 <p:sld xmlns:a="http://schemas.openxmlformats.org/drawingml/2006/main" xmlns:r="http://schemas.openxmlformats.org/officeDocument/2006/relationships" xmlns:p="http://schemas.openxmlformats.org/presentationml/2006/main">
   <p:cSld>
@@ -5761,6 +5942,80 @@
         </p:nvSpPr>
         <p:spPr>
           <a:xfrm>
+            <a:off x="4847000" y="4305300"/>
+            <a:ext cx="8593999" cy="1384674"/>
+          </a:xfrm>
+          <a:prstGeom prst="rect">
+            <a:avLst/>
+          </a:prstGeom>
+        </p:spPr>
+        <p:txBody>
+          <a:bodyPr wrap="square" lIns="0" tIns="0" rIns="0" bIns="0" rtlCol="0" anchor="t">
+            <a:spAutoFit/>
+          </a:bodyPr>
+          <a:lstStyle/>
+          <a:p>
+            <a:pPr algn="ctr">
+              <a:lnSpc>
+                <a:spcPts val="11000"/>
+              </a:lnSpc>
+            </a:pPr>
+            <a:r>
+              <a:rPr lang="en-US" sz="9000" dirty="0" err="1">
+                <a:solidFill>
+                  <a:srgbClr val="000000"/>
+                </a:solidFill>
+                <a:latin typeface="Lovelo"/>
+              </a:rPr>
+              <a:t>agrupar</a:t>
+            </a:r>
+            <a:endParaRPr lang="en-US" sz="9000" dirty="0">
+              <a:solidFill>
+                <a:srgbClr val="000000"/>
+              </a:solidFill>
+              <a:latin typeface="Lovelo"/>
+            </a:endParaRPr>
+          </a:p>
+        </p:txBody>
+      </p:sp>
+    </p:spTree>
+    <p:extLst>
+      <p:ext uri="{BB962C8B-B14F-4D97-AF65-F5344CB8AC3E}">
+        <p14:creationId xmlns:p14="http://schemas.microsoft.com/office/powerpoint/2010/main" val="122220413"/>
+      </p:ext>
+    </p:extLst>
+  </p:cSld>
+  <p:clrMapOvr>
+    <a:masterClrMapping/>
+  </p:clrMapOvr>
+</p:sld>
+</file>
+
+<file path=ppt/slides/slide26.xml><?xml version="1.0" encoding="utf-8"?>
+<p:sld xmlns:a="http://schemas.openxmlformats.org/drawingml/2006/main" xmlns:r="http://schemas.openxmlformats.org/officeDocument/2006/relationships" xmlns:p="http://schemas.openxmlformats.org/presentationml/2006/main">
+  <p:cSld>
+    <p:spTree>
+      <p:nvGrpSpPr>
+        <p:cNvPr id="1" name=""/>
+        <p:cNvGrpSpPr/>
+        <p:nvPr/>
+      </p:nvGrpSpPr>
+      <p:grpSpPr>
+        <a:xfrm>
+          <a:off x="0" y="0"/>
+          <a:ext cx="0" cy="0"/>
+          <a:chOff x="0" y="0"/>
+          <a:chExt cx="0" cy="0"/>
+        </a:xfrm>
+      </p:grpSpPr>
+      <p:sp>
+        <p:nvSpPr>
+          <p:cNvPr id="2" name="TextBox 2"/>
+          <p:cNvSpPr txBox="1"/>
+          <p:nvPr/>
+        </p:nvSpPr>
+        <p:spPr>
+          <a:xfrm>
             <a:off x="3369401" y="4137743"/>
             <a:ext cx="12117830" cy="1384674"/>
           </a:xfrm>
@@ -5810,7 +6065,7 @@
 </p:sld>
 </file>
 
-<file path=ppt/slides/slide26.xml><?xml version="1.0" encoding="utf-8"?>
+<file path=ppt/slides/slide27.xml><?xml version="1.0" encoding="utf-8"?>
 <p:sld xmlns:a="http://schemas.openxmlformats.org/drawingml/2006/main" xmlns:r="http://schemas.openxmlformats.org/officeDocument/2006/relationships" xmlns:p="http://schemas.openxmlformats.org/presentationml/2006/main">
   <p:cSld>
     <p:bg>
@@ -6589,7 +6844,7 @@
 </p:sld>
 </file>
 
-<file path=ppt/slides/slide27.xml><?xml version="1.0" encoding="utf-8"?>
+<file path=ppt/slides/slide28.xml><?xml version="1.0" encoding="utf-8"?>
 <p:sld xmlns:a="http://schemas.openxmlformats.org/drawingml/2006/main" xmlns:r="http://schemas.openxmlformats.org/officeDocument/2006/relationships" xmlns:p="http://schemas.openxmlformats.org/presentationml/2006/main">
   <p:cSld>
     <p:spTree>
@@ -6879,92 +7134,6 @@
 </p:sld>
 </file>
 
-<file path=ppt/slides/slide28.xml><?xml version="1.0" encoding="utf-8"?>
-<p:sld xmlns:a="http://schemas.openxmlformats.org/drawingml/2006/main" xmlns:r="http://schemas.openxmlformats.org/officeDocument/2006/relationships" xmlns:p="http://schemas.openxmlformats.org/presentationml/2006/main">
-  <p:cSld>
-    <p:spTree>
-      <p:nvGrpSpPr>
-        <p:cNvPr id="1" name=""/>
-        <p:cNvGrpSpPr/>
-        <p:nvPr/>
-      </p:nvGrpSpPr>
-      <p:grpSpPr>
-        <a:xfrm>
-          <a:off x="0" y="0"/>
-          <a:ext cx="0" cy="0"/>
-          <a:chOff x="0" y="0"/>
-          <a:chExt cx="0" cy="0"/>
-        </a:xfrm>
-      </p:grpSpPr>
-      <p:sp>
-        <p:nvSpPr>
-          <p:cNvPr id="2" name="TextBox 2"/>
-          <p:cNvSpPr txBox="1"/>
-          <p:nvPr/>
-        </p:nvSpPr>
-        <p:spPr>
-          <a:xfrm>
-            <a:off x="5151800" y="4076700"/>
-            <a:ext cx="7984399" cy="1384674"/>
-          </a:xfrm>
-          <a:prstGeom prst="rect">
-            <a:avLst/>
-          </a:prstGeom>
-        </p:spPr>
-        <p:txBody>
-          <a:bodyPr wrap="square" lIns="0" tIns="0" rIns="0" bIns="0" rtlCol="0" anchor="t">
-            <a:spAutoFit/>
-          </a:bodyPr>
-          <a:lstStyle/>
-          <a:p>
-            <a:pPr>
-              <a:lnSpc>
-                <a:spcPts val="11000"/>
-              </a:lnSpc>
-            </a:pPr>
-            <a:r>
-              <a:rPr lang="en-US" sz="9000" dirty="0">
-                <a:solidFill>
-                  <a:srgbClr val="000000"/>
-                </a:solidFill>
-                <a:latin typeface="Lovelo"/>
-              </a:rPr>
-              <a:t>¿</a:t>
-            </a:r>
-            <a:r>
-              <a:rPr lang="en-US" sz="9000" dirty="0" err="1">
-                <a:solidFill>
-                  <a:srgbClr val="000000"/>
-                </a:solidFill>
-                <a:latin typeface="Lovelo"/>
-              </a:rPr>
-              <a:t>Herencia</a:t>
-            </a:r>
-            <a:r>
-              <a:rPr lang="en-US" sz="9000" dirty="0">
-                <a:solidFill>
-                  <a:srgbClr val="000000"/>
-                </a:solidFill>
-                <a:latin typeface="Lovelo"/>
-              </a:rPr>
-              <a:t>?</a:t>
-            </a:r>
-          </a:p>
-        </p:txBody>
-      </p:sp>
-    </p:spTree>
-    <p:extLst>
-      <p:ext uri="{BB962C8B-B14F-4D97-AF65-F5344CB8AC3E}">
-        <p14:creationId xmlns:p14="http://schemas.microsoft.com/office/powerpoint/2010/main" val="479249600"/>
-      </p:ext>
-    </p:extLst>
-  </p:cSld>
-  <p:clrMapOvr>
-    <a:masterClrMapping/>
-  </p:clrMapOvr>
-</p:sld>
-</file>
-
 <file path=ppt/slides/slide29.xml><?xml version="1.0" encoding="utf-8"?>
 <p:sld xmlns:a="http://schemas.openxmlformats.org/drawingml/2006/main" xmlns:r="http://schemas.openxmlformats.org/officeDocument/2006/relationships" xmlns:p="http://schemas.openxmlformats.org/presentationml/2006/main">
   <p:cSld>
@@ -6984,95 +7153,14 @@
       </p:grpSpPr>
       <p:sp>
         <p:nvSpPr>
-          <p:cNvPr id="3" name="TextBox 3"/>
+          <p:cNvPr id="2" name="TextBox 2"/>
           <p:cNvSpPr txBox="1"/>
           <p:nvPr/>
         </p:nvSpPr>
         <p:spPr>
           <a:xfrm>
-            <a:off x="5434071" y="3162300"/>
-            <a:ext cx="7419857" cy="5027017"/>
-          </a:xfrm>
-          <a:prstGeom prst="rect">
-            <a:avLst/>
-          </a:prstGeom>
-        </p:spPr>
-        <p:txBody>
-          <a:bodyPr lIns="0" tIns="0" rIns="0" bIns="0" rtlCol="0" anchor="t">
-            <a:spAutoFit/>
-          </a:bodyPr>
-          <a:lstStyle/>
-          <a:p>
-            <a:pPr>
-              <a:lnSpc>
-                <a:spcPts val="5599"/>
-              </a:lnSpc>
-            </a:pPr>
-            <a:r>
-              <a:rPr lang="es-ES" sz="4000" b="0" i="0" dirty="0">
-                <a:solidFill>
-                  <a:srgbClr val="0D0D0D"/>
-                </a:solidFill>
-                <a:effectLst/>
-                <a:latin typeface="Söhne"/>
-              </a:rPr>
-              <a:t>Mecanismo que permite la creación de una nueva clase basada en una clase existente, heredando sus propiedades y comportamientos.</a:t>
-            </a:r>
-          </a:p>
-          <a:p>
-            <a:pPr>
-              <a:lnSpc>
-                <a:spcPts val="5599"/>
-              </a:lnSpc>
-            </a:pPr>
-            <a:endParaRPr lang="es-ES" sz="4000" dirty="0">
-              <a:solidFill>
-                <a:srgbClr val="0D0D0D"/>
-              </a:solidFill>
-              <a:latin typeface="Söhne"/>
-            </a:endParaRPr>
-          </a:p>
-          <a:p>
-            <a:pPr>
-              <a:lnSpc>
-                <a:spcPts val="5599"/>
-              </a:lnSpc>
-            </a:pPr>
-            <a:r>
-              <a:rPr lang="es-ES" sz="4000" b="0" i="0" dirty="0">
-                <a:solidFill>
-                  <a:srgbClr val="0D0D0D"/>
-                </a:solidFill>
-                <a:effectLst/>
-                <a:latin typeface="Söhne"/>
-              </a:rPr>
-              <a:t>Esto fomenta la reutilización del código.</a:t>
-            </a:r>
-            <a:endParaRPr lang="en-US" sz="3999" dirty="0">
-              <a:solidFill>
-                <a:srgbClr val="000000"/>
-              </a:solidFill>
-              <a:latin typeface="Catamaran Light"/>
-            </a:endParaRPr>
-          </a:p>
-        </p:txBody>
-      </p:sp>
-      <p:sp>
-        <p:nvSpPr>
-          <p:cNvPr id="5" name="TextBox 2">
-            <a:extLst>
-              <a:ext uri="{FF2B5EF4-FFF2-40B4-BE49-F238E27FC236}">
-                <a16:creationId xmlns:a16="http://schemas.microsoft.com/office/drawing/2014/main" id="{18709E71-569F-BFD2-DE3F-415A41F94AAF}"/>
-              </a:ext>
-            </a:extLst>
-          </p:cNvPr>
-          <p:cNvSpPr txBox="1"/>
-          <p:nvPr/>
-        </p:nvSpPr>
-        <p:spPr>
-          <a:xfrm>
-            <a:off x="5753100" y="1333500"/>
-            <a:ext cx="6781800" cy="1312090"/>
+            <a:off x="5151800" y="4076700"/>
+            <a:ext cx="7984399" cy="1384674"/>
           </a:xfrm>
           <a:prstGeom prst="rect">
             <a:avLst/>
@@ -7090,27 +7178,39 @@
               </a:lnSpc>
             </a:pPr>
             <a:r>
-              <a:rPr lang="en-US" sz="7000" dirty="0" err="1">
+              <a:rPr lang="en-US" sz="9000" dirty="0">
                 <a:solidFill>
                   <a:srgbClr val="000000"/>
                 </a:solidFill>
                 <a:latin typeface="Lovelo"/>
               </a:rPr>
+              <a:t>¿</a:t>
+            </a:r>
+            <a:r>
+              <a:rPr lang="en-US" sz="9000" dirty="0" err="1">
+                <a:solidFill>
+                  <a:srgbClr val="000000"/>
+                </a:solidFill>
+                <a:latin typeface="Lovelo"/>
+              </a:rPr>
               <a:t>Herencia</a:t>
             </a:r>
-            <a:endParaRPr lang="en-US" sz="7000" dirty="0">
-              <a:solidFill>
-                <a:srgbClr val="000000"/>
-              </a:solidFill>
-              <a:latin typeface="Lovelo"/>
-            </a:endParaRPr>
+            <a:r>
+              <a:rPr lang="en-US" sz="9000" dirty="0">
+                <a:solidFill>
+                  <a:srgbClr val="000000"/>
+                </a:solidFill>
+                <a:latin typeface="Lovelo"/>
+              </a:rPr>
+              <a:t>?</a:t>
+            </a:r>
           </a:p>
         </p:txBody>
       </p:sp>
     </p:spTree>
     <p:extLst>
       <p:ext uri="{BB962C8B-B14F-4D97-AF65-F5344CB8AC3E}">
-        <p14:creationId xmlns:p14="http://schemas.microsoft.com/office/powerpoint/2010/main" val="2774396336"/>
+        <p14:creationId xmlns:p14="http://schemas.microsoft.com/office/powerpoint/2010/main" val="479249600"/>
       </p:ext>
     </p:extLst>
   </p:cSld>
@@ -7312,10 +7412,85 @@
       </p:grpSpPr>
       <p:sp>
         <p:nvSpPr>
-          <p:cNvPr id="2" name="TextBox 2">
+          <p:cNvPr id="3" name="TextBox 3"/>
+          <p:cNvSpPr txBox="1"/>
+          <p:nvPr/>
+        </p:nvSpPr>
+        <p:spPr>
+          <a:xfrm>
+            <a:off x="5434071" y="3162300"/>
+            <a:ext cx="7419857" cy="5027017"/>
+          </a:xfrm>
+          <a:prstGeom prst="rect">
+            <a:avLst/>
+          </a:prstGeom>
+        </p:spPr>
+        <p:txBody>
+          <a:bodyPr lIns="0" tIns="0" rIns="0" bIns="0" rtlCol="0" anchor="t">
+            <a:spAutoFit/>
+          </a:bodyPr>
+          <a:lstStyle/>
+          <a:p>
+            <a:pPr>
+              <a:lnSpc>
+                <a:spcPts val="5599"/>
+              </a:lnSpc>
+            </a:pPr>
+            <a:r>
+              <a:rPr lang="es-ES" sz="4000" b="0" i="0" dirty="0">
+                <a:solidFill>
+                  <a:srgbClr val="0D0D0D"/>
+                </a:solidFill>
+                <a:effectLst/>
+                <a:latin typeface="Söhne"/>
+              </a:rPr>
+              <a:t>Mecanismo que permite la creación de una nueva clase basada en una clase existente, heredando sus propiedades y comportamientos.</a:t>
+            </a:r>
+          </a:p>
+          <a:p>
+            <a:pPr>
+              <a:lnSpc>
+                <a:spcPts val="5599"/>
+              </a:lnSpc>
+            </a:pPr>
+            <a:endParaRPr lang="es-ES" sz="4000" dirty="0">
+              <a:solidFill>
+                <a:srgbClr val="0D0D0D"/>
+              </a:solidFill>
+              <a:latin typeface="Söhne"/>
+            </a:endParaRPr>
+          </a:p>
+          <a:p>
+            <a:pPr>
+              <a:lnSpc>
+                <a:spcPts val="5599"/>
+              </a:lnSpc>
+            </a:pPr>
+            <a:r>
+              <a:rPr lang="es-ES" sz="4000" b="0" i="0" dirty="0">
+                <a:solidFill>
+                  <a:srgbClr val="0D0D0D"/>
+                </a:solidFill>
+                <a:effectLst/>
+                <a:latin typeface="Söhne"/>
+              </a:rPr>
+              <a:t>Esto fomenta la reutilización del código.</a:t>
+            </a:r>
+            <a:endParaRPr lang="en-US" sz="3999" dirty="0">
+              <a:solidFill>
+                <a:srgbClr val="000000"/>
+              </a:solidFill>
+              <a:latin typeface="Catamaran Light"/>
+            </a:endParaRPr>
+          </a:p>
+        </p:txBody>
+      </p:sp>
+      <p:sp>
+        <p:nvSpPr>
+          <p:cNvPr id="5" name="TextBox 2">
             <a:extLst>
               <a:ext uri="{FF2B5EF4-FFF2-40B4-BE49-F238E27FC236}">
-                <a16:creationId xmlns:a16="http://schemas.microsoft.com/office/drawing/2014/main" id="{29B2CFD1-7A47-C52E-EC73-77871C16598C}"/>
+                <a16:creationId xmlns:a16="http://schemas.microsoft.com/office/drawing/2014/main" id="{18709E71-569F-BFD2-DE3F-415A41F94AAF}"/>
               </a:ext>
             </a:extLst>
           </p:cNvPr>
@@ -7324,103 +7499,46 @@
         </p:nvSpPr>
         <p:spPr>
           <a:xfrm>
-            <a:off x="2329883" y="3942080"/>
-            <a:ext cx="7419857" cy="795089"/>
+            <a:off x="5753100" y="1333500"/>
+            <a:ext cx="6781800" cy="1312090"/>
           </a:xfrm>
           <a:prstGeom prst="rect">
             <a:avLst/>
           </a:prstGeom>
         </p:spPr>
         <p:txBody>
-          <a:bodyPr lIns="0" tIns="0" rIns="0" bIns="0" rtlCol="0" anchor="t">
+          <a:bodyPr wrap="square" lIns="0" tIns="0" rIns="0" bIns="0" rtlCol="0" anchor="t">
             <a:spAutoFit/>
           </a:bodyPr>
           <a:lstStyle/>
           <a:p>
             <a:pPr>
               <a:lnSpc>
-                <a:spcPts val="6159"/>
+                <a:spcPts val="11000"/>
               </a:lnSpc>
             </a:pPr>
             <a:r>
-              <a:rPr lang="en-US" sz="4399" dirty="0" err="1">
-                <a:solidFill>
-                  <a:srgbClr val="000000"/>
-                </a:solidFill>
-                <a:latin typeface="Catamaran Light"/>
-              </a:rPr>
-              <a:t>Mostrar</a:t>
-            </a:r>
-            <a:r>
-              <a:rPr lang="en-US" sz="4399" dirty="0">
-                <a:solidFill>
-                  <a:srgbClr val="000000"/>
-                </a:solidFill>
-                <a:latin typeface="Catamaran Light"/>
-              </a:rPr>
-              <a:t> </a:t>
-            </a:r>
-            <a:r>
-              <a:rPr lang="en-US" sz="4399" dirty="0" err="1">
-                <a:solidFill>
-                  <a:srgbClr val="000000"/>
-                </a:solidFill>
-                <a:latin typeface="Catamaran Light"/>
-              </a:rPr>
-              <a:t>en</a:t>
-            </a:r>
-            <a:r>
-              <a:rPr lang="en-US" sz="4399" dirty="0">
-                <a:solidFill>
-                  <a:srgbClr val="000000"/>
-                </a:solidFill>
-                <a:latin typeface="Catamaran Light"/>
-              </a:rPr>
-              <a:t> </a:t>
-            </a:r>
-            <a:r>
-              <a:rPr lang="en-US" sz="4399" dirty="0" err="1">
-                <a:solidFill>
-                  <a:srgbClr val="000000"/>
-                </a:solidFill>
-                <a:latin typeface="Catamaran Light"/>
-              </a:rPr>
-              <a:t>codigo</a:t>
-            </a:r>
-            <a:r>
-              <a:rPr lang="en-US" sz="4399" dirty="0">
-                <a:solidFill>
-                  <a:srgbClr val="000000"/>
-                </a:solidFill>
-                <a:latin typeface="Catamaran Light"/>
-              </a:rPr>
-              <a:t> la </a:t>
-            </a:r>
-            <a:r>
-              <a:rPr lang="en-US" sz="4399" dirty="0" err="1">
-                <a:solidFill>
-                  <a:srgbClr val="000000"/>
-                </a:solidFill>
-                <a:latin typeface="Catamaran Light"/>
-              </a:rPr>
-              <a:t>herencia</a:t>
-            </a:r>
-            <a:r>
-              <a:rPr lang="en-US" sz="4399" dirty="0">
-                <a:solidFill>
-                  <a:srgbClr val="000000"/>
-                </a:solidFill>
-                <a:latin typeface="Catamaran Light"/>
-              </a:rPr>
-              <a:t>.</a:t>
-            </a:r>
+              <a:rPr lang="en-US" sz="7000" dirty="0" err="1">
+                <a:solidFill>
+                  <a:srgbClr val="000000"/>
+                </a:solidFill>
+                <a:latin typeface="Lovelo"/>
+              </a:rPr>
+              <a:t>Herencia</a:t>
+            </a:r>
+            <a:endParaRPr lang="en-US" sz="7000" dirty="0">
+              <a:solidFill>
+                <a:srgbClr val="000000"/>
+              </a:solidFill>
+              <a:latin typeface="Lovelo"/>
+            </a:endParaRPr>
           </a:p>
         </p:txBody>
       </p:sp>
     </p:spTree>
     <p:extLst>
       <p:ext uri="{BB962C8B-B14F-4D97-AF65-F5344CB8AC3E}">
-        <p14:creationId xmlns:p14="http://schemas.microsoft.com/office/powerpoint/2010/main" val="1128431473"/>
+        <p14:creationId xmlns:p14="http://schemas.microsoft.com/office/powerpoint/2010/main" val="2774396336"/>
       </p:ext>
     </p:extLst>
   </p:cSld>
@@ -7462,7 +7580,7 @@
         <p:spPr>
           <a:xfrm>
             <a:off x="2329883" y="3942080"/>
-            <a:ext cx="7419857" cy="11131252"/>
+            <a:ext cx="7419857" cy="795089"/>
           </a:xfrm>
           <a:prstGeom prst="rect">
             <a:avLst/>
@@ -7486,7 +7604,7 @@
                 </a:solidFill>
                 <a:latin typeface="Catamaran Light"/>
               </a:rPr>
-              <a:t>Metodo</a:t>
+              <a:t>Mostrar</a:t>
             </a:r>
             <a:r>
               <a:rPr lang="en-US" sz="4399" dirty="0">
@@ -7495,7 +7613,7 @@
                 </a:solidFill>
                 <a:latin typeface="Catamaran Light"/>
               </a:rPr>
-              <a:t> constructor.  El </a:t>
+              <a:t> </a:t>
             </a:r>
             <a:r>
               <a:rPr lang="en-US" sz="4399" dirty="0" err="1">
@@ -7504,7 +7622,7 @@
                 </a:solidFill>
                 <a:latin typeface="Catamaran Light"/>
               </a:rPr>
-              <a:t>metodo</a:t>
+              <a:t>en</a:t>
             </a:r>
             <a:r>
               <a:rPr lang="en-US" sz="4399" dirty="0">
@@ -7513,7 +7631,7 @@
                 </a:solidFill>
                 <a:latin typeface="Catamaran Light"/>
               </a:rPr>
-              <a:t> constructor no se </a:t>
+              <a:t> </a:t>
             </a:r>
             <a:r>
               <a:rPr lang="en-US" sz="4399" dirty="0" err="1">
@@ -7522,7 +7640,7 @@
                 </a:solidFill>
                 <a:latin typeface="Catamaran Light"/>
               </a:rPr>
-              <a:t>hereda</a:t>
+              <a:t>codigo</a:t>
             </a:r>
             <a:r>
               <a:rPr lang="en-US" sz="4399" dirty="0">
@@ -7531,28 +7649,8 @@
                 </a:solidFill>
                 <a:latin typeface="Catamaran Light"/>
               </a:rPr>
-              <a:t>.</a:t>
-            </a:r>
-          </a:p>
-          <a:p>
-            <a:pPr>
-              <a:lnSpc>
-                <a:spcPts val="6159"/>
-              </a:lnSpc>
-            </a:pPr>
-            <a:endParaRPr lang="en-US" sz="4399" dirty="0">
-              <a:solidFill>
-                <a:srgbClr val="000000"/>
-              </a:solidFill>
-              <a:latin typeface="Catamaran Light"/>
-            </a:endParaRPr>
-          </a:p>
-          <a:p>
-            <a:pPr>
-              <a:lnSpc>
-                <a:spcPts val="6159"/>
-              </a:lnSpc>
-            </a:pPr>
+              <a:t> la </a:t>
+            </a:r>
             <a:r>
               <a:rPr lang="en-US" sz="4399" dirty="0" err="1">
                 <a:solidFill>
@@ -7560,307 +7658,7 @@
                 </a:solidFill>
                 <a:latin typeface="Catamaran Light"/>
               </a:rPr>
-              <a:t>Uso</a:t>
-            </a:r>
-            <a:r>
-              <a:rPr lang="en-US" sz="4399" dirty="0">
-                <a:solidFill>
-                  <a:srgbClr val="000000"/>
-                </a:solidFill>
-                <a:latin typeface="Catamaran Light"/>
-              </a:rPr>
-              <a:t> de this</a:t>
-            </a:r>
-          </a:p>
-          <a:p>
-            <a:pPr>
-              <a:lnSpc>
-                <a:spcPts val="6159"/>
-              </a:lnSpc>
-            </a:pPr>
-            <a:r>
-              <a:rPr lang="en-US" sz="4399" dirty="0">
-                <a:solidFill>
-                  <a:srgbClr val="000000"/>
-                </a:solidFill>
-                <a:latin typeface="Catamaran Light"/>
-              </a:rPr>
-              <a:t>static</a:t>
-            </a:r>
-          </a:p>
-          <a:p>
-            <a:pPr>
-              <a:lnSpc>
-                <a:spcPts val="6159"/>
-              </a:lnSpc>
-            </a:pPr>
-            <a:r>
-              <a:rPr lang="en-US" sz="4399" dirty="0" err="1">
-                <a:solidFill>
-                  <a:srgbClr val="000000"/>
-                </a:solidFill>
-                <a:latin typeface="Catamaran Light"/>
-              </a:rPr>
-              <a:t>Miembros</a:t>
-            </a:r>
-            <a:r>
-              <a:rPr lang="en-US" sz="4399" dirty="0">
-                <a:solidFill>
-                  <a:srgbClr val="000000"/>
-                </a:solidFill>
-                <a:latin typeface="Catamaran Light"/>
-              </a:rPr>
-              <a:t> de </a:t>
-            </a:r>
-            <a:r>
-              <a:rPr lang="en-US" sz="4399" dirty="0" err="1">
-                <a:solidFill>
-                  <a:srgbClr val="000000"/>
-                </a:solidFill>
-                <a:latin typeface="Catamaran Light"/>
-              </a:rPr>
-              <a:t>instancia</a:t>
-            </a:r>
-            <a:endParaRPr lang="en-US" sz="4399" dirty="0">
-              <a:solidFill>
-                <a:srgbClr val="000000"/>
-              </a:solidFill>
-              <a:latin typeface="Catamaran Light"/>
-            </a:endParaRPr>
-          </a:p>
-          <a:p>
-            <a:pPr>
-              <a:lnSpc>
-                <a:spcPts val="6159"/>
-              </a:lnSpc>
-            </a:pPr>
-            <a:r>
-              <a:rPr lang="en-US" sz="4399" dirty="0" err="1">
-                <a:solidFill>
-                  <a:srgbClr val="000000"/>
-                </a:solidFill>
-                <a:latin typeface="Catamaran Light"/>
-              </a:rPr>
-              <a:t>Miembros</a:t>
-            </a:r>
-            <a:r>
-              <a:rPr lang="en-US" sz="4399" dirty="0">
-                <a:solidFill>
-                  <a:srgbClr val="000000"/>
-                </a:solidFill>
-                <a:latin typeface="Catamaran Light"/>
-              </a:rPr>
-              <a:t> de </a:t>
-            </a:r>
-            <a:r>
-              <a:rPr lang="en-US" sz="4399" dirty="0" err="1">
-                <a:solidFill>
-                  <a:srgbClr val="000000"/>
-                </a:solidFill>
-                <a:latin typeface="Catamaran Light"/>
-              </a:rPr>
-              <a:t>clase</a:t>
-            </a:r>
-            <a:endParaRPr lang="en-US" sz="4399" dirty="0">
-              <a:solidFill>
-                <a:srgbClr val="000000"/>
-              </a:solidFill>
-              <a:latin typeface="Catamaran Light"/>
-            </a:endParaRPr>
-          </a:p>
-          <a:p>
-            <a:pPr>
-              <a:lnSpc>
-                <a:spcPts val="6159"/>
-              </a:lnSpc>
-            </a:pPr>
-            <a:endParaRPr lang="en-US" sz="4399" dirty="0">
-              <a:solidFill>
-                <a:srgbClr val="000000"/>
-              </a:solidFill>
-              <a:latin typeface="Catamaran Light"/>
-            </a:endParaRPr>
-          </a:p>
-          <a:p>
-            <a:pPr>
-              <a:lnSpc>
-                <a:spcPts val="6159"/>
-              </a:lnSpc>
-            </a:pPr>
-            <a:r>
-              <a:rPr lang="en-US" sz="4399" dirty="0" err="1">
-                <a:solidFill>
-                  <a:srgbClr val="000000"/>
-                </a:solidFill>
-                <a:latin typeface="Catamaran Light"/>
-              </a:rPr>
-              <a:t>Sobrecarga</a:t>
-            </a:r>
-            <a:r>
-              <a:rPr lang="en-US" sz="4399" dirty="0">
-                <a:solidFill>
-                  <a:srgbClr val="000000"/>
-                </a:solidFill>
-                <a:latin typeface="Catamaran Light"/>
-              </a:rPr>
-              <a:t> de </a:t>
-            </a:r>
-            <a:r>
-              <a:rPr lang="en-US" sz="4399" dirty="0" err="1">
-                <a:solidFill>
-                  <a:srgbClr val="000000"/>
-                </a:solidFill>
-                <a:latin typeface="Catamaran Light"/>
-              </a:rPr>
-              <a:t>metodos</a:t>
-            </a:r>
-            <a:r>
-              <a:rPr lang="en-US" sz="4399" dirty="0">
-                <a:solidFill>
-                  <a:srgbClr val="000000"/>
-                </a:solidFill>
-                <a:latin typeface="Catamaran Light"/>
-              </a:rPr>
-              <a:t>.</a:t>
-            </a:r>
-          </a:p>
-          <a:p>
-            <a:pPr>
-              <a:lnSpc>
-                <a:spcPts val="6159"/>
-              </a:lnSpc>
-            </a:pPr>
-            <a:endParaRPr lang="en-US" sz="4399" dirty="0">
-              <a:solidFill>
-                <a:srgbClr val="000000"/>
-              </a:solidFill>
-              <a:latin typeface="Catamaran Light"/>
-            </a:endParaRPr>
-          </a:p>
-          <a:p>
-            <a:pPr>
-              <a:lnSpc>
-                <a:spcPts val="6159"/>
-              </a:lnSpc>
-            </a:pPr>
-            <a:r>
-              <a:rPr lang="en-US" sz="4399" dirty="0" err="1">
-                <a:solidFill>
-                  <a:srgbClr val="000000"/>
-                </a:solidFill>
-                <a:latin typeface="Catamaran Light"/>
-              </a:rPr>
-              <a:t>Clases</a:t>
-            </a:r>
-            <a:r>
-              <a:rPr lang="en-US" sz="4399" dirty="0">
-                <a:solidFill>
-                  <a:srgbClr val="000000"/>
-                </a:solidFill>
-                <a:latin typeface="Catamaran Light"/>
-              </a:rPr>
-              <a:t> </a:t>
-            </a:r>
-            <a:r>
-              <a:rPr lang="en-US" sz="4399" dirty="0" err="1">
-                <a:solidFill>
-                  <a:srgbClr val="000000"/>
-                </a:solidFill>
-                <a:latin typeface="Catamaran Light"/>
-              </a:rPr>
-              <a:t>abstractas</a:t>
-            </a:r>
-            <a:r>
-              <a:rPr lang="en-US" sz="4399" dirty="0">
-                <a:solidFill>
-                  <a:srgbClr val="000000"/>
-                </a:solidFill>
-                <a:latin typeface="Catamaran Light"/>
-              </a:rPr>
-              <a:t>.</a:t>
-            </a:r>
-          </a:p>
-          <a:p>
-            <a:pPr>
-              <a:lnSpc>
-                <a:spcPts val="6159"/>
-              </a:lnSpc>
-            </a:pPr>
-            <a:endParaRPr lang="en-US" sz="4399" dirty="0">
-              <a:solidFill>
-                <a:srgbClr val="000000"/>
-              </a:solidFill>
-              <a:latin typeface="Catamaran Light"/>
-            </a:endParaRPr>
-          </a:p>
-          <a:p>
-            <a:pPr>
-              <a:lnSpc>
-                <a:spcPts val="6159"/>
-              </a:lnSpc>
-            </a:pPr>
-            <a:r>
-              <a:rPr lang="en-US" sz="4399" dirty="0" err="1">
-                <a:solidFill>
-                  <a:srgbClr val="000000"/>
-                </a:solidFill>
-                <a:latin typeface="Catamaran Light"/>
-              </a:rPr>
-              <a:t>Metodos</a:t>
-            </a:r>
-            <a:r>
-              <a:rPr lang="en-US" sz="4399" dirty="0">
-                <a:solidFill>
-                  <a:srgbClr val="000000"/>
-                </a:solidFill>
-                <a:latin typeface="Catamaran Light"/>
-              </a:rPr>
-              <a:t> </a:t>
-            </a:r>
-            <a:r>
-              <a:rPr lang="en-US" sz="4399" dirty="0" err="1">
-                <a:solidFill>
-                  <a:srgbClr val="000000"/>
-                </a:solidFill>
-                <a:latin typeface="Catamaran Light"/>
-              </a:rPr>
-              <a:t>abstractos</a:t>
-            </a:r>
-            <a:r>
-              <a:rPr lang="en-US" sz="4399" dirty="0">
-                <a:solidFill>
-                  <a:srgbClr val="000000"/>
-                </a:solidFill>
-                <a:latin typeface="Catamaran Light"/>
-              </a:rPr>
-              <a:t>. </a:t>
-            </a:r>
-            <a:r>
-              <a:rPr lang="en-US" sz="4399" dirty="0" err="1">
-                <a:solidFill>
-                  <a:srgbClr val="000000"/>
-                </a:solidFill>
-                <a:latin typeface="Catamaran Light"/>
-              </a:rPr>
-              <a:t>Metodos</a:t>
-            </a:r>
-            <a:r>
-              <a:rPr lang="en-US" sz="4399" dirty="0">
-                <a:solidFill>
-                  <a:srgbClr val="000000"/>
-                </a:solidFill>
-                <a:latin typeface="Catamaran Light"/>
-              </a:rPr>
-              <a:t> </a:t>
-            </a:r>
-            <a:r>
-              <a:rPr lang="en-US" sz="4399" dirty="0" err="1">
-                <a:solidFill>
-                  <a:srgbClr val="000000"/>
-                </a:solidFill>
-                <a:latin typeface="Catamaran Light"/>
-              </a:rPr>
-              <a:t>virtuales</a:t>
+              <a:t>herencia</a:t>
             </a:r>
             <a:r>
               <a:rPr lang="en-US" sz="4399" dirty="0">
@@ -7877,7 +7675,7 @@
     </p:spTree>
     <p:extLst>
       <p:ext uri="{BB962C8B-B14F-4D97-AF65-F5344CB8AC3E}">
-        <p14:creationId xmlns:p14="http://schemas.microsoft.com/office/powerpoint/2010/main" val="3151845387"/>
+        <p14:creationId xmlns:p14="http://schemas.microsoft.com/office/powerpoint/2010/main" val="1128431473"/>
       </p:ext>
     </p:extLst>
   </p:cSld>
@@ -7906,73 +7704,20 @@
       </p:grpSpPr>
       <p:sp>
         <p:nvSpPr>
-          <p:cNvPr id="2" name="Freeform 2"/>
-          <p:cNvSpPr/>
-          <p:nvPr/>
-        </p:nvSpPr>
-        <p:spPr>
-          <a:xfrm>
-            <a:off x="12402783" y="2918286"/>
-            <a:ext cx="3987615" cy="4114800"/>
-          </a:xfrm>
-          <a:custGeom>
-            <a:avLst/>
-            <a:gdLst/>
-            <a:ahLst/>
-            <a:cxnLst/>
-            <a:rect l="l" t="t" r="r" b="b"/>
-            <a:pathLst>
-              <a:path w="3987615" h="4114800">
-                <a:moveTo>
-                  <a:pt x="0" y="0"/>
-                </a:moveTo>
-                <a:lnTo>
-                  <a:pt x="3987615" y="0"/>
-                </a:lnTo>
-                <a:lnTo>
-                  <a:pt x="3987615" y="4114800"/>
-                </a:lnTo>
-                <a:lnTo>
-                  <a:pt x="0" y="4114800"/>
-                </a:lnTo>
-                <a:lnTo>
-                  <a:pt x="0" y="0"/>
-                </a:lnTo>
-                <a:close/>
-              </a:path>
-            </a:pathLst>
-          </a:custGeom>
-          <a:blipFill>
-            <a:blip r:embed="rId2">
-              <a:extLst>
-                <a:ext uri="{96DAC541-7B7A-43D3-8B79-37D633B846F1}">
-                  <asvg:svgBlip xmlns:asvg="http://schemas.microsoft.com/office/drawing/2016/SVG/main" r:embed="rId3"/>
-                </a:ext>
-              </a:extLst>
-            </a:blip>
-            <a:stretch>
-              <a:fillRect/>
-            </a:stretch>
-          </a:blipFill>
-        </p:spPr>
-        <p:txBody>
-          <a:bodyPr/>
-          <a:lstStyle/>
-          <a:p>
-            <a:endParaRPr lang="en-US"/>
-          </a:p>
-        </p:txBody>
-      </p:sp>
-      <p:sp>
-        <p:nvSpPr>
-          <p:cNvPr id="3" name="TextBox 3"/>
+          <p:cNvPr id="2" name="TextBox 2">
+            <a:extLst>
+              <a:ext uri="{FF2B5EF4-FFF2-40B4-BE49-F238E27FC236}">
+                <a16:creationId xmlns:a16="http://schemas.microsoft.com/office/drawing/2014/main" id="{29B2CFD1-7A47-C52E-EC73-77871C16598C}"/>
+              </a:ext>
+            </a:extLst>
+          </p:cNvPr>
           <p:cNvSpPr txBox="1"/>
           <p:nvPr/>
         </p:nvSpPr>
         <p:spPr>
           <a:xfrm>
-            <a:off x="2329883" y="3781823"/>
-            <a:ext cx="7419857" cy="4203701"/>
+            <a:off x="2329883" y="3942080"/>
+            <a:ext cx="7419857" cy="11131252"/>
           </a:xfrm>
           <a:prstGeom prst="rect">
             <a:avLst/>
@@ -7986,68 +7731,400 @@
           <a:p>
             <a:pPr>
               <a:lnSpc>
-                <a:spcPts val="5599"/>
+                <a:spcPts val="6159"/>
               </a:lnSpc>
             </a:pPr>
             <a:r>
-              <a:rPr lang="en-US" sz="3999">
-                <a:solidFill>
-                  <a:srgbClr val="000000"/>
-                </a:solidFill>
-                <a:latin typeface="Catamaran Light"/>
-              </a:rPr>
-              <a:t>Teoría o conjunto de teorías cuya validez se acepta sin cuestionar y que suministra la base y modelo para resolver problemas y avanzar en el conocimiento. (RAE)</a:t>
+              <a:rPr lang="en-US" sz="4399" dirty="0" err="1">
+                <a:solidFill>
+                  <a:srgbClr val="000000"/>
+                </a:solidFill>
+                <a:latin typeface="Catamaran Light"/>
+              </a:rPr>
+              <a:t>Metodo</a:t>
+            </a:r>
+            <a:r>
+              <a:rPr lang="en-US" sz="4399" dirty="0">
+                <a:solidFill>
+                  <a:srgbClr val="000000"/>
+                </a:solidFill>
+                <a:latin typeface="Catamaran Light"/>
+              </a:rPr>
+              <a:t> constructor.  El </a:t>
+            </a:r>
+            <a:r>
+              <a:rPr lang="en-US" sz="4399" dirty="0" err="1">
+                <a:solidFill>
+                  <a:srgbClr val="000000"/>
+                </a:solidFill>
+                <a:latin typeface="Catamaran Light"/>
+              </a:rPr>
+              <a:t>metodo</a:t>
+            </a:r>
+            <a:r>
+              <a:rPr lang="en-US" sz="4399" dirty="0">
+                <a:solidFill>
+                  <a:srgbClr val="000000"/>
+                </a:solidFill>
+                <a:latin typeface="Catamaran Light"/>
+              </a:rPr>
+              <a:t> constructor no se </a:t>
+            </a:r>
+            <a:r>
+              <a:rPr lang="en-US" sz="4399" dirty="0" err="1">
+                <a:solidFill>
+                  <a:srgbClr val="000000"/>
+                </a:solidFill>
+                <a:latin typeface="Catamaran Light"/>
+              </a:rPr>
+              <a:t>hereda</a:t>
+            </a:r>
+            <a:r>
+              <a:rPr lang="en-US" sz="4399" dirty="0">
+                <a:solidFill>
+                  <a:srgbClr val="000000"/>
+                </a:solidFill>
+                <a:latin typeface="Catamaran Light"/>
+              </a:rPr>
+              <a:t>.</a:t>
             </a:r>
           </a:p>
           <a:p>
             <a:pPr>
               <a:lnSpc>
-                <a:spcPts val="5599"/>
+                <a:spcPts val="6159"/>
               </a:lnSpc>
             </a:pPr>
-            <a:endParaRPr lang="en-US" sz="3999">
+            <a:endParaRPr lang="en-US" sz="4399" dirty="0">
               <a:solidFill>
                 <a:srgbClr val="000000"/>
               </a:solidFill>
               <a:latin typeface="Catamaran Light"/>
             </a:endParaRPr>
           </a:p>
-        </p:txBody>
-      </p:sp>
-      <p:sp>
-        <p:nvSpPr>
-          <p:cNvPr id="4" name="TextBox 4"/>
-          <p:cNvSpPr txBox="1"/>
-          <p:nvPr/>
-        </p:nvSpPr>
-        <p:spPr>
-          <a:xfrm>
-            <a:off x="2329883" y="2594003"/>
-            <a:ext cx="8214942" cy="1031240"/>
-          </a:xfrm>
-          <a:prstGeom prst="rect">
-            <a:avLst/>
-          </a:prstGeom>
-        </p:spPr>
-        <p:txBody>
-          <a:bodyPr lIns="0" tIns="0" rIns="0" bIns="0" rtlCol="0" anchor="t">
-            <a:spAutoFit/>
-          </a:bodyPr>
-          <a:lstStyle/>
           <a:p>
             <a:pPr>
               <a:lnSpc>
-                <a:spcPts val="7600"/>
+                <a:spcPts val="6159"/>
               </a:lnSpc>
             </a:pPr>
             <a:r>
-              <a:rPr lang="en-US" sz="7600">
-                <a:solidFill>
-                  <a:srgbClr val="000000"/>
-                </a:solidFill>
-                <a:latin typeface="Lovelo"/>
-              </a:rPr>
-              <a:t>Paradigma</a:t>
+              <a:rPr lang="en-US" sz="4399" dirty="0" err="1">
+                <a:solidFill>
+                  <a:srgbClr val="000000"/>
+                </a:solidFill>
+                <a:latin typeface="Catamaran Light"/>
+              </a:rPr>
+              <a:t>Uso</a:t>
+            </a:r>
+            <a:r>
+              <a:rPr lang="en-US" sz="4399" dirty="0">
+                <a:solidFill>
+                  <a:srgbClr val="000000"/>
+                </a:solidFill>
+                <a:latin typeface="Catamaran Light"/>
+              </a:rPr>
+              <a:t> de this</a:t>
+            </a:r>
+          </a:p>
+          <a:p>
+            <a:pPr>
+              <a:lnSpc>
+                <a:spcPts val="6159"/>
+              </a:lnSpc>
+            </a:pPr>
+            <a:r>
+              <a:rPr lang="en-US" sz="4399" dirty="0">
+                <a:solidFill>
+                  <a:srgbClr val="000000"/>
+                </a:solidFill>
+                <a:latin typeface="Catamaran Light"/>
+              </a:rPr>
+              <a:t>static</a:t>
+            </a:r>
+          </a:p>
+          <a:p>
+            <a:pPr>
+              <a:lnSpc>
+                <a:spcPts val="6159"/>
+              </a:lnSpc>
+            </a:pPr>
+            <a:r>
+              <a:rPr lang="en-US" sz="4399" dirty="0" err="1">
+                <a:solidFill>
+                  <a:srgbClr val="000000"/>
+                </a:solidFill>
+                <a:latin typeface="Catamaran Light"/>
+              </a:rPr>
+              <a:t>Miembros</a:t>
+            </a:r>
+            <a:r>
+              <a:rPr lang="en-US" sz="4399" dirty="0">
+                <a:solidFill>
+                  <a:srgbClr val="000000"/>
+                </a:solidFill>
+                <a:latin typeface="Catamaran Light"/>
+              </a:rPr>
+              <a:t> de </a:t>
+            </a:r>
+            <a:r>
+              <a:rPr lang="en-US" sz="4399" dirty="0" err="1">
+                <a:solidFill>
+                  <a:srgbClr val="000000"/>
+                </a:solidFill>
+                <a:latin typeface="Catamaran Light"/>
+              </a:rPr>
+              <a:t>instancia</a:t>
+            </a:r>
+            <a:endParaRPr lang="en-US" sz="4399" dirty="0">
+              <a:solidFill>
+                <a:srgbClr val="000000"/>
+              </a:solidFill>
+              <a:latin typeface="Catamaran Light"/>
+            </a:endParaRPr>
+          </a:p>
+          <a:p>
+            <a:pPr>
+              <a:lnSpc>
+                <a:spcPts val="6159"/>
+              </a:lnSpc>
+            </a:pPr>
+            <a:r>
+              <a:rPr lang="en-US" sz="4399" dirty="0" err="1">
+                <a:solidFill>
+                  <a:srgbClr val="000000"/>
+                </a:solidFill>
+                <a:latin typeface="Catamaran Light"/>
+              </a:rPr>
+              <a:t>Miembros</a:t>
+            </a:r>
+            <a:r>
+              <a:rPr lang="en-US" sz="4399" dirty="0">
+                <a:solidFill>
+                  <a:srgbClr val="000000"/>
+                </a:solidFill>
+                <a:latin typeface="Catamaran Light"/>
+              </a:rPr>
+              <a:t> de </a:t>
+            </a:r>
+            <a:r>
+              <a:rPr lang="en-US" sz="4399" dirty="0" err="1">
+                <a:solidFill>
+                  <a:srgbClr val="000000"/>
+                </a:solidFill>
+                <a:latin typeface="Catamaran Light"/>
+              </a:rPr>
+              <a:t>clase</a:t>
+            </a:r>
+            <a:endParaRPr lang="en-US" sz="4399" dirty="0">
+              <a:solidFill>
+                <a:srgbClr val="000000"/>
+              </a:solidFill>
+              <a:latin typeface="Catamaran Light"/>
+            </a:endParaRPr>
+          </a:p>
+          <a:p>
+            <a:pPr>
+              <a:lnSpc>
+                <a:spcPts val="6159"/>
+              </a:lnSpc>
+            </a:pPr>
+            <a:endParaRPr lang="en-US" sz="4399" dirty="0">
+              <a:solidFill>
+                <a:srgbClr val="000000"/>
+              </a:solidFill>
+              <a:latin typeface="Catamaran Light"/>
+            </a:endParaRPr>
+          </a:p>
+          <a:p>
+            <a:pPr>
+              <a:lnSpc>
+                <a:spcPts val="6159"/>
+              </a:lnSpc>
+            </a:pPr>
+            <a:r>
+              <a:rPr lang="en-US" sz="4399" dirty="0" err="1">
+                <a:solidFill>
+                  <a:srgbClr val="000000"/>
+                </a:solidFill>
+                <a:latin typeface="Catamaran Light"/>
+              </a:rPr>
+              <a:t>Sobrecarga</a:t>
+            </a:r>
+            <a:r>
+              <a:rPr lang="en-US" sz="4399" dirty="0">
+                <a:solidFill>
+                  <a:srgbClr val="000000"/>
+                </a:solidFill>
+                <a:latin typeface="Catamaran Light"/>
+              </a:rPr>
+              <a:t> de </a:t>
+            </a:r>
+            <a:r>
+              <a:rPr lang="en-US" sz="4399" dirty="0" err="1">
+                <a:solidFill>
+                  <a:srgbClr val="000000"/>
+                </a:solidFill>
+                <a:latin typeface="Catamaran Light"/>
+              </a:rPr>
+              <a:t>metodos</a:t>
+            </a:r>
+            <a:r>
+              <a:rPr lang="en-US" sz="4399" dirty="0">
+                <a:solidFill>
+                  <a:srgbClr val="000000"/>
+                </a:solidFill>
+                <a:latin typeface="Catamaran Light"/>
+              </a:rPr>
+              <a:t>.</a:t>
+            </a:r>
+          </a:p>
+          <a:p>
+            <a:pPr>
+              <a:lnSpc>
+                <a:spcPts val="6159"/>
+              </a:lnSpc>
+            </a:pPr>
+            <a:endParaRPr lang="en-US" sz="4399" dirty="0">
+              <a:solidFill>
+                <a:srgbClr val="000000"/>
+              </a:solidFill>
+              <a:latin typeface="Catamaran Light"/>
+            </a:endParaRPr>
+          </a:p>
+          <a:p>
+            <a:pPr>
+              <a:lnSpc>
+                <a:spcPts val="6159"/>
+              </a:lnSpc>
+            </a:pPr>
+            <a:r>
+              <a:rPr lang="en-US" sz="4399" dirty="0" err="1">
+                <a:solidFill>
+                  <a:srgbClr val="000000"/>
+                </a:solidFill>
+                <a:latin typeface="Catamaran Light"/>
+              </a:rPr>
+              <a:t>Clases</a:t>
+            </a:r>
+            <a:r>
+              <a:rPr lang="en-US" sz="4399" dirty="0">
+                <a:solidFill>
+                  <a:srgbClr val="000000"/>
+                </a:solidFill>
+                <a:latin typeface="Catamaran Light"/>
+              </a:rPr>
+              <a:t> </a:t>
+            </a:r>
+            <a:r>
+              <a:rPr lang="en-US" sz="4399" dirty="0" err="1">
+                <a:solidFill>
+                  <a:srgbClr val="000000"/>
+                </a:solidFill>
+                <a:latin typeface="Catamaran Light"/>
+              </a:rPr>
+              <a:t>abstractas</a:t>
+            </a:r>
+            <a:r>
+              <a:rPr lang="en-US" sz="4399" dirty="0">
+                <a:solidFill>
+                  <a:srgbClr val="000000"/>
+                </a:solidFill>
+                <a:latin typeface="Catamaran Light"/>
+              </a:rPr>
+              <a:t>.</a:t>
+            </a:r>
+          </a:p>
+          <a:p>
+            <a:pPr>
+              <a:lnSpc>
+                <a:spcPts val="6159"/>
+              </a:lnSpc>
+            </a:pPr>
+            <a:endParaRPr lang="en-US" sz="4399" dirty="0">
+              <a:solidFill>
+                <a:srgbClr val="000000"/>
+              </a:solidFill>
+              <a:latin typeface="Catamaran Light"/>
+            </a:endParaRPr>
+          </a:p>
+          <a:p>
+            <a:pPr>
+              <a:lnSpc>
+                <a:spcPts val="6159"/>
+              </a:lnSpc>
+            </a:pPr>
+            <a:r>
+              <a:rPr lang="en-US" sz="4399" dirty="0" err="1">
+                <a:solidFill>
+                  <a:srgbClr val="000000"/>
+                </a:solidFill>
+                <a:latin typeface="Catamaran Light"/>
+              </a:rPr>
+              <a:t>Metodos</a:t>
+            </a:r>
+            <a:r>
+              <a:rPr lang="en-US" sz="4399" dirty="0">
+                <a:solidFill>
+                  <a:srgbClr val="000000"/>
+                </a:solidFill>
+                <a:latin typeface="Catamaran Light"/>
+              </a:rPr>
+              <a:t> </a:t>
+            </a:r>
+            <a:r>
+              <a:rPr lang="en-US" sz="4399" dirty="0" err="1">
+                <a:solidFill>
+                  <a:srgbClr val="000000"/>
+                </a:solidFill>
+                <a:latin typeface="Catamaran Light"/>
+              </a:rPr>
+              <a:t>abstractos</a:t>
+            </a:r>
+            <a:r>
+              <a:rPr lang="en-US" sz="4399" dirty="0">
+                <a:solidFill>
+                  <a:srgbClr val="000000"/>
+                </a:solidFill>
+                <a:latin typeface="Catamaran Light"/>
+              </a:rPr>
+              <a:t>. </a:t>
+            </a:r>
+            <a:r>
+              <a:rPr lang="en-US" sz="4399" dirty="0" err="1">
+                <a:solidFill>
+                  <a:srgbClr val="000000"/>
+                </a:solidFill>
+                <a:latin typeface="Catamaran Light"/>
+              </a:rPr>
+              <a:t>Metodos</a:t>
+            </a:r>
+            <a:r>
+              <a:rPr lang="en-US" sz="4399" dirty="0">
+                <a:solidFill>
+                  <a:srgbClr val="000000"/>
+                </a:solidFill>
+                <a:latin typeface="Catamaran Light"/>
+              </a:rPr>
+              <a:t> </a:t>
+            </a:r>
+            <a:r>
+              <a:rPr lang="en-US" sz="4399" dirty="0" err="1">
+                <a:solidFill>
+                  <a:srgbClr val="000000"/>
+                </a:solidFill>
+                <a:latin typeface="Catamaran Light"/>
+              </a:rPr>
+              <a:t>virtuales</a:t>
+            </a:r>
+            <a:r>
+              <a:rPr lang="en-US" sz="4399" dirty="0">
+                <a:solidFill>
+                  <a:srgbClr val="000000"/>
+                </a:solidFill>
+                <a:latin typeface="Catamaran Light"/>
+              </a:rPr>
+              <a:t>.</a:t>
             </a:r>
           </a:p>
         </p:txBody>
@@ -8055,7 +8132,7 @@
     </p:spTree>
     <p:extLst>
       <p:ext uri="{BB962C8B-B14F-4D97-AF65-F5344CB8AC3E}">
-        <p14:creationId xmlns:p14="http://schemas.microsoft.com/office/powerpoint/2010/main" val="1635547806"/>
+        <p14:creationId xmlns:p14="http://schemas.microsoft.com/office/powerpoint/2010/main" val="3151845387"/>
       </p:ext>
     </p:extLst>
   </p:cSld>
@@ -8233,6 +8310,184 @@
     </p:spTree>
     <p:extLst>
       <p:ext uri="{BB962C8B-B14F-4D97-AF65-F5344CB8AC3E}">
+        <p14:creationId xmlns:p14="http://schemas.microsoft.com/office/powerpoint/2010/main" val="1635547806"/>
+      </p:ext>
+    </p:extLst>
+  </p:cSld>
+  <p:clrMapOvr>
+    <a:masterClrMapping/>
+  </p:clrMapOvr>
+</p:sld>
+</file>
+
+<file path=ppt/slides/slide34.xml><?xml version="1.0" encoding="utf-8"?>
+<p:sld xmlns:a="http://schemas.openxmlformats.org/drawingml/2006/main" xmlns:r="http://schemas.openxmlformats.org/officeDocument/2006/relationships" xmlns:p="http://schemas.openxmlformats.org/presentationml/2006/main">
+  <p:cSld>
+    <p:spTree>
+      <p:nvGrpSpPr>
+        <p:cNvPr id="1" name=""/>
+        <p:cNvGrpSpPr/>
+        <p:nvPr/>
+      </p:nvGrpSpPr>
+      <p:grpSpPr>
+        <a:xfrm>
+          <a:off x="0" y="0"/>
+          <a:ext cx="0" cy="0"/>
+          <a:chOff x="0" y="0"/>
+          <a:chExt cx="0" cy="0"/>
+        </a:xfrm>
+      </p:grpSpPr>
+      <p:sp>
+        <p:nvSpPr>
+          <p:cNvPr id="2" name="Freeform 2"/>
+          <p:cNvSpPr/>
+          <p:nvPr/>
+        </p:nvSpPr>
+        <p:spPr>
+          <a:xfrm>
+            <a:off x="12402783" y="2918286"/>
+            <a:ext cx="3987615" cy="4114800"/>
+          </a:xfrm>
+          <a:custGeom>
+            <a:avLst/>
+            <a:gdLst/>
+            <a:ahLst/>
+            <a:cxnLst/>
+            <a:rect l="l" t="t" r="r" b="b"/>
+            <a:pathLst>
+              <a:path w="3987615" h="4114800">
+                <a:moveTo>
+                  <a:pt x="0" y="0"/>
+                </a:moveTo>
+                <a:lnTo>
+                  <a:pt x="3987615" y="0"/>
+                </a:lnTo>
+                <a:lnTo>
+                  <a:pt x="3987615" y="4114800"/>
+                </a:lnTo>
+                <a:lnTo>
+                  <a:pt x="0" y="4114800"/>
+                </a:lnTo>
+                <a:lnTo>
+                  <a:pt x="0" y="0"/>
+                </a:lnTo>
+                <a:close/>
+              </a:path>
+            </a:pathLst>
+          </a:custGeom>
+          <a:blipFill>
+            <a:blip r:embed="rId2">
+              <a:extLst>
+                <a:ext uri="{96DAC541-7B7A-43D3-8B79-37D633B846F1}">
+                  <asvg:svgBlip xmlns:asvg="http://schemas.microsoft.com/office/drawing/2016/SVG/main" r:embed="rId3"/>
+                </a:ext>
+              </a:extLst>
+            </a:blip>
+            <a:stretch>
+              <a:fillRect/>
+            </a:stretch>
+          </a:blipFill>
+        </p:spPr>
+        <p:txBody>
+          <a:bodyPr/>
+          <a:lstStyle/>
+          <a:p>
+            <a:endParaRPr lang="en-US"/>
+          </a:p>
+        </p:txBody>
+      </p:sp>
+      <p:sp>
+        <p:nvSpPr>
+          <p:cNvPr id="3" name="TextBox 3"/>
+          <p:cNvSpPr txBox="1"/>
+          <p:nvPr/>
+        </p:nvSpPr>
+        <p:spPr>
+          <a:xfrm>
+            <a:off x="2329883" y="3781823"/>
+            <a:ext cx="7419857" cy="4203701"/>
+          </a:xfrm>
+          <a:prstGeom prst="rect">
+            <a:avLst/>
+          </a:prstGeom>
+        </p:spPr>
+        <p:txBody>
+          <a:bodyPr lIns="0" tIns="0" rIns="0" bIns="0" rtlCol="0" anchor="t">
+            <a:spAutoFit/>
+          </a:bodyPr>
+          <a:lstStyle/>
+          <a:p>
+            <a:pPr>
+              <a:lnSpc>
+                <a:spcPts val="5599"/>
+              </a:lnSpc>
+            </a:pPr>
+            <a:r>
+              <a:rPr lang="en-US" sz="3999">
+                <a:solidFill>
+                  <a:srgbClr val="000000"/>
+                </a:solidFill>
+                <a:latin typeface="Catamaran Light"/>
+              </a:rPr>
+              <a:t>Teoría o conjunto de teorías cuya validez se acepta sin cuestionar y que suministra la base y modelo para resolver problemas y avanzar en el conocimiento. (RAE)</a:t>
+            </a:r>
+          </a:p>
+          <a:p>
+            <a:pPr>
+              <a:lnSpc>
+                <a:spcPts val="5599"/>
+              </a:lnSpc>
+            </a:pPr>
+            <a:endParaRPr lang="en-US" sz="3999">
+              <a:solidFill>
+                <a:srgbClr val="000000"/>
+              </a:solidFill>
+              <a:latin typeface="Catamaran Light"/>
+            </a:endParaRPr>
+          </a:p>
+        </p:txBody>
+      </p:sp>
+      <p:sp>
+        <p:nvSpPr>
+          <p:cNvPr id="4" name="TextBox 4"/>
+          <p:cNvSpPr txBox="1"/>
+          <p:nvPr/>
+        </p:nvSpPr>
+        <p:spPr>
+          <a:xfrm>
+            <a:off x="2329883" y="2594003"/>
+            <a:ext cx="8214942" cy="1031240"/>
+          </a:xfrm>
+          <a:prstGeom prst="rect">
+            <a:avLst/>
+          </a:prstGeom>
+        </p:spPr>
+        <p:txBody>
+          <a:bodyPr lIns="0" tIns="0" rIns="0" bIns="0" rtlCol="0" anchor="t">
+            <a:spAutoFit/>
+          </a:bodyPr>
+          <a:lstStyle/>
+          <a:p>
+            <a:pPr>
+              <a:lnSpc>
+                <a:spcPts val="7600"/>
+              </a:lnSpc>
+            </a:pPr>
+            <a:r>
+              <a:rPr lang="en-US" sz="7600">
+                <a:solidFill>
+                  <a:srgbClr val="000000"/>
+                </a:solidFill>
+                <a:latin typeface="Lovelo"/>
+              </a:rPr>
+              <a:t>Paradigma</a:t>
+            </a:r>
+          </a:p>
+        </p:txBody>
+      </p:sp>
+    </p:spTree>
+    <p:extLst>
+      <p:ext uri="{BB962C8B-B14F-4D97-AF65-F5344CB8AC3E}">
         <p14:creationId xmlns:p14="http://schemas.microsoft.com/office/powerpoint/2010/main" val="197403145"/>
       </p:ext>
     </p:extLst>
@@ -8243,7 +8498,7 @@
 </p:sld>
 </file>
 
-<file path=ppt/slides/slide34.xml><?xml version="1.0" encoding="utf-8"?>
+<file path=ppt/slides/slide35.xml><?xml version="1.0" encoding="utf-8"?>
 <p:sld xmlns:a="http://schemas.openxmlformats.org/drawingml/2006/main" xmlns:r="http://schemas.openxmlformats.org/officeDocument/2006/relationships" xmlns:p="http://schemas.openxmlformats.org/presentationml/2006/main">
   <p:cSld>
     <p:bg>
@@ -8773,7 +9028,7 @@
 </p:sld>
 </file>
 
-<file path=ppt/slides/slide35.xml><?xml version="1.0" encoding="utf-8"?>
+<file path=ppt/slides/slide36.xml><?xml version="1.0" encoding="utf-8"?>
 <p:sld xmlns:a="http://schemas.openxmlformats.org/drawingml/2006/main" xmlns:r="http://schemas.openxmlformats.org/officeDocument/2006/relationships" xmlns:p="http://schemas.openxmlformats.org/presentationml/2006/main">
   <p:cSld>
     <p:spTree>
@@ -9898,7 +10153,7 @@
 </p:sld>
 </file>
 
-<file path=ppt/slides/slide36.xml><?xml version="1.0" encoding="utf-8"?>
+<file path=ppt/slides/slide37.xml><?xml version="1.0" encoding="utf-8"?>
 <p:sld xmlns:a="http://schemas.openxmlformats.org/drawingml/2006/main" xmlns:r="http://schemas.openxmlformats.org/officeDocument/2006/relationships" xmlns:p="http://schemas.openxmlformats.org/presentationml/2006/main">
   <p:cSld>
     <p:bg>
@@ -10209,7 +10464,7 @@
 </p:sld>
 </file>
 
-<file path=ppt/slides/slide37.xml><?xml version="1.0" encoding="utf-8"?>
+<file path=ppt/slides/slide38.xml><?xml version="1.0" encoding="utf-8"?>
 <p:sld xmlns:a="http://schemas.openxmlformats.org/drawingml/2006/main" xmlns:r="http://schemas.openxmlformats.org/officeDocument/2006/relationships" xmlns:p="http://schemas.openxmlformats.org/presentationml/2006/main">
   <p:cSld>
     <p:bg>
@@ -10393,7 +10648,7 @@
 </p:sld>
 </file>
 
-<file path=ppt/slides/slide38.xml><?xml version="1.0" encoding="utf-8"?>
+<file path=ppt/slides/slide39.xml><?xml version="1.0" encoding="utf-8"?>
 <p:sld xmlns:a="http://schemas.openxmlformats.org/drawingml/2006/main" xmlns:r="http://schemas.openxmlformats.org/officeDocument/2006/relationships" xmlns:p="http://schemas.openxmlformats.org/presentationml/2006/main">
   <p:cSld>
     <p:bg>
@@ -10637,7 +10892,733 @@
 </p:sld>
 </file>
 
-<file path=ppt/slides/slide39.xml><?xml version="1.0" encoding="utf-8"?>
+<file path=ppt/slides/slide4.xml><?xml version="1.0" encoding="utf-8"?>
+<p:sld xmlns:a="http://schemas.openxmlformats.org/drawingml/2006/main" xmlns:r="http://schemas.openxmlformats.org/officeDocument/2006/relationships" xmlns:p="http://schemas.openxmlformats.org/presentationml/2006/main">
+  <p:cSld>
+    <p:spTree>
+      <p:nvGrpSpPr>
+        <p:cNvPr id="1" name=""/>
+        <p:cNvGrpSpPr/>
+        <p:nvPr/>
+      </p:nvGrpSpPr>
+      <p:grpSpPr>
+        <a:xfrm>
+          <a:off x="0" y="0"/>
+          <a:ext cx="0" cy="0"/>
+          <a:chOff x="0" y="0"/>
+          <a:chExt cx="0" cy="0"/>
+        </a:xfrm>
+      </p:grpSpPr>
+      <p:sp>
+        <p:nvSpPr>
+          <p:cNvPr id="2" name="TextBox 2"/>
+          <p:cNvSpPr txBox="1"/>
+          <p:nvPr/>
+        </p:nvSpPr>
+        <p:spPr>
+          <a:xfrm>
+            <a:off x="2329883" y="2422871"/>
+            <a:ext cx="7419857" cy="7758534"/>
+          </a:xfrm>
+          <a:prstGeom prst="rect">
+            <a:avLst/>
+          </a:prstGeom>
+        </p:spPr>
+        <p:txBody>
+          <a:bodyPr lIns="0" tIns="0" rIns="0" bIns="0" rtlCol="0" anchor="t">
+            <a:spAutoFit/>
+          </a:bodyPr>
+          <a:lstStyle/>
+          <a:p>
+            <a:pPr>
+              <a:lnSpc>
+                <a:spcPts val="5459"/>
+              </a:lnSpc>
+            </a:pPr>
+            <a:r>
+              <a:rPr lang="en-US" sz="3899" dirty="0">
+                <a:solidFill>
+                  <a:srgbClr val="000000"/>
+                </a:solidFill>
+                <a:latin typeface="Catamaran Light"/>
+              </a:rPr>
+              <a:t>Con </a:t>
+            </a:r>
+            <a:r>
+              <a:rPr lang="en-US" sz="3899" dirty="0" err="1">
+                <a:solidFill>
+                  <a:srgbClr val="000000"/>
+                </a:solidFill>
+                <a:latin typeface="Catamaran Light"/>
+              </a:rPr>
+              <a:t>este</a:t>
+            </a:r>
+            <a:r>
+              <a:rPr lang="en-US" sz="3899" dirty="0">
+                <a:solidFill>
+                  <a:srgbClr val="000000"/>
+                </a:solidFill>
+                <a:latin typeface="Catamaran Light"/>
+              </a:rPr>
+              <a:t> </a:t>
+            </a:r>
+            <a:r>
+              <a:rPr lang="en-US" sz="3899" dirty="0" err="1">
+                <a:solidFill>
+                  <a:srgbClr val="000000"/>
+                </a:solidFill>
+                <a:latin typeface="Catamaran Light"/>
+              </a:rPr>
+              <a:t>enfoque</a:t>
+            </a:r>
+            <a:r>
+              <a:rPr lang="en-US" sz="3899" dirty="0">
+                <a:solidFill>
+                  <a:srgbClr val="000000"/>
+                </a:solidFill>
+                <a:latin typeface="Catamaran Light"/>
+              </a:rPr>
+              <a:t> se </a:t>
+            </a:r>
+            <a:r>
+              <a:rPr lang="en-US" sz="3899" dirty="0" err="1">
+                <a:solidFill>
+                  <a:srgbClr val="000000"/>
+                </a:solidFill>
+                <a:latin typeface="Catamaran Light"/>
+              </a:rPr>
+              <a:t>organiza</a:t>
+            </a:r>
+            <a:r>
+              <a:rPr lang="en-US" sz="3899" dirty="0">
+                <a:solidFill>
+                  <a:srgbClr val="000000"/>
+                </a:solidFill>
+                <a:latin typeface="Catamaran Light"/>
+              </a:rPr>
+              <a:t> </a:t>
+            </a:r>
+            <a:r>
+              <a:rPr lang="en-US" sz="3899" dirty="0" err="1">
+                <a:solidFill>
+                  <a:srgbClr val="000000"/>
+                </a:solidFill>
+                <a:latin typeface="Catamaran Light"/>
+              </a:rPr>
+              <a:t>el</a:t>
+            </a:r>
+            <a:r>
+              <a:rPr lang="en-US" sz="3899" dirty="0">
+                <a:solidFill>
+                  <a:srgbClr val="000000"/>
+                </a:solidFill>
+                <a:latin typeface="Catamaran Light"/>
+              </a:rPr>
+              <a:t> </a:t>
+            </a:r>
+            <a:r>
+              <a:rPr lang="en-US" sz="3899" dirty="0" err="1">
+                <a:solidFill>
+                  <a:srgbClr val="000000"/>
+                </a:solidFill>
+                <a:latin typeface="Catamaran Light"/>
+              </a:rPr>
+              <a:t>código</a:t>
+            </a:r>
+            <a:r>
+              <a:rPr lang="en-US" sz="3899" dirty="0">
+                <a:solidFill>
+                  <a:srgbClr val="000000"/>
+                </a:solidFill>
+                <a:latin typeface="Catamaran Light"/>
+              </a:rPr>
+              <a:t> </a:t>
+            </a:r>
+            <a:r>
+              <a:rPr lang="en-US" sz="3899" dirty="0" err="1">
+                <a:solidFill>
+                  <a:srgbClr val="000000"/>
+                </a:solidFill>
+                <a:latin typeface="Catamaran Light"/>
+              </a:rPr>
+              <a:t>en</a:t>
+            </a:r>
+            <a:r>
+              <a:rPr lang="en-US" sz="3899" dirty="0">
+                <a:solidFill>
+                  <a:srgbClr val="000000"/>
+                </a:solidFill>
+                <a:latin typeface="Catamaran Light"/>
+              </a:rPr>
+              <a:t> </a:t>
+            </a:r>
+            <a:r>
+              <a:rPr lang="en-US" sz="3899" dirty="0" err="1">
+                <a:solidFill>
+                  <a:srgbClr val="000000"/>
+                </a:solidFill>
+                <a:latin typeface="Catamaran Light"/>
+              </a:rPr>
+              <a:t>unidades</a:t>
+            </a:r>
+            <a:r>
+              <a:rPr lang="en-US" sz="3899" dirty="0">
+                <a:solidFill>
+                  <a:srgbClr val="000000"/>
+                </a:solidFill>
+                <a:latin typeface="Catamaran Light"/>
+              </a:rPr>
+              <a:t> </a:t>
+            </a:r>
+            <a:r>
+              <a:rPr lang="en-US" sz="3899" dirty="0" err="1">
+                <a:solidFill>
+                  <a:srgbClr val="000000"/>
+                </a:solidFill>
+                <a:latin typeface="Catamaran Light"/>
+              </a:rPr>
+              <a:t>llamadas</a:t>
+            </a:r>
+            <a:r>
+              <a:rPr lang="en-US" sz="3899" dirty="0">
+                <a:solidFill>
+                  <a:srgbClr val="000000"/>
+                </a:solidFill>
+                <a:latin typeface="Catamaran Light"/>
+              </a:rPr>
+              <a:t> </a:t>
+            </a:r>
+            <a:r>
+              <a:rPr lang="en-US" sz="3899" dirty="0" err="1">
+                <a:solidFill>
+                  <a:srgbClr val="000000"/>
+                </a:solidFill>
+                <a:latin typeface="Catamaran Bold"/>
+              </a:rPr>
+              <a:t>clases</a:t>
+            </a:r>
+            <a:r>
+              <a:rPr lang="en-US" sz="3899" dirty="0">
+                <a:solidFill>
+                  <a:srgbClr val="000000"/>
+                </a:solidFill>
+                <a:latin typeface="Catamaran Light"/>
+              </a:rPr>
+              <a:t>.</a:t>
+            </a:r>
+          </a:p>
+          <a:p>
+            <a:pPr>
+              <a:lnSpc>
+                <a:spcPts val="5459"/>
+              </a:lnSpc>
+            </a:pPr>
+            <a:endParaRPr lang="en-US" sz="3899" dirty="0">
+              <a:solidFill>
+                <a:srgbClr val="000000"/>
+              </a:solidFill>
+              <a:latin typeface="Catamaran Light"/>
+            </a:endParaRPr>
+          </a:p>
+          <a:p>
+            <a:pPr>
+              <a:lnSpc>
+                <a:spcPts val="5459"/>
+              </a:lnSpc>
+            </a:pPr>
+            <a:r>
+              <a:rPr lang="en-US" sz="3899" dirty="0">
+                <a:solidFill>
+                  <a:srgbClr val="000000"/>
+                </a:solidFill>
+                <a:latin typeface="Catamaran Light"/>
+              </a:rPr>
+              <a:t>En las </a:t>
+            </a:r>
+            <a:r>
+              <a:rPr lang="en-US" sz="3899" dirty="0" err="1">
+                <a:solidFill>
+                  <a:srgbClr val="000000"/>
+                </a:solidFill>
+                <a:latin typeface="Catamaran Light"/>
+              </a:rPr>
+              <a:t>clases</a:t>
+            </a:r>
+            <a:r>
+              <a:rPr lang="en-US" sz="3899" dirty="0">
+                <a:solidFill>
+                  <a:srgbClr val="000000"/>
+                </a:solidFill>
+                <a:latin typeface="Catamaran Light"/>
+              </a:rPr>
+              <a:t> </a:t>
+            </a:r>
+            <a:r>
+              <a:rPr lang="en-US" sz="3899" dirty="0" err="1">
+                <a:solidFill>
+                  <a:srgbClr val="000000"/>
+                </a:solidFill>
+                <a:latin typeface="Catamaran Light"/>
+              </a:rPr>
+              <a:t>tú</a:t>
+            </a:r>
+            <a:r>
+              <a:rPr lang="en-US" sz="3899" dirty="0">
+                <a:solidFill>
+                  <a:srgbClr val="000000"/>
+                </a:solidFill>
+                <a:latin typeface="Catamaran Light"/>
+              </a:rPr>
+              <a:t> pones las </a:t>
+            </a:r>
+            <a:r>
+              <a:rPr lang="en-US" sz="3899" dirty="0" err="1">
+                <a:solidFill>
+                  <a:srgbClr val="000000"/>
+                </a:solidFill>
+                <a:latin typeface="Catamaran Light"/>
+              </a:rPr>
+              <a:t>distintas</a:t>
+            </a:r>
+            <a:r>
+              <a:rPr lang="en-US" sz="3899" dirty="0">
+                <a:solidFill>
+                  <a:srgbClr val="000000"/>
+                </a:solidFill>
+                <a:latin typeface="Catamaran Light"/>
+              </a:rPr>
+              <a:t> </a:t>
+            </a:r>
+            <a:r>
+              <a:rPr lang="en-US" sz="3899" dirty="0" err="1">
+                <a:solidFill>
+                  <a:srgbClr val="000000"/>
+                </a:solidFill>
+                <a:latin typeface="Catamaran Bold"/>
+              </a:rPr>
+              <a:t>funcionalidades</a:t>
+            </a:r>
+            <a:r>
+              <a:rPr lang="en-US" sz="3899" dirty="0">
+                <a:solidFill>
+                  <a:srgbClr val="000000"/>
+                </a:solidFill>
+                <a:latin typeface="Catamaran Bold"/>
+              </a:rPr>
+              <a:t>, </a:t>
+            </a:r>
+            <a:r>
+              <a:rPr lang="en-US" sz="3899" dirty="0">
+                <a:solidFill>
+                  <a:srgbClr val="000000"/>
+                </a:solidFill>
+                <a:latin typeface="Catamaran Light"/>
+              </a:rPr>
+              <a:t>y/o </a:t>
+            </a:r>
+            <a:r>
+              <a:rPr lang="en-US" sz="3899" dirty="0" err="1">
+                <a:solidFill>
+                  <a:srgbClr val="000000"/>
+                </a:solidFill>
+                <a:latin typeface="Catamaran Light"/>
+              </a:rPr>
+              <a:t>modelar</a:t>
+            </a:r>
+            <a:r>
+              <a:rPr lang="en-US" sz="3899" dirty="0">
+                <a:solidFill>
+                  <a:srgbClr val="000000"/>
+                </a:solidFill>
+                <a:latin typeface="Catamaran Light"/>
+              </a:rPr>
+              <a:t> </a:t>
+            </a:r>
+            <a:r>
+              <a:rPr lang="en-US" sz="3899" dirty="0" err="1">
+                <a:solidFill>
+                  <a:srgbClr val="000000"/>
+                </a:solidFill>
+                <a:latin typeface="Catamaran Light"/>
+              </a:rPr>
+              <a:t>los</a:t>
+            </a:r>
+            <a:r>
+              <a:rPr lang="en-US" sz="3899" dirty="0">
+                <a:solidFill>
+                  <a:srgbClr val="000000"/>
+                </a:solidFill>
+                <a:latin typeface="Catamaran Light"/>
+              </a:rPr>
+              <a:t> </a:t>
+            </a:r>
+            <a:r>
+              <a:rPr lang="en-US" sz="3899" dirty="0" err="1">
+                <a:solidFill>
+                  <a:srgbClr val="000000"/>
+                </a:solidFill>
+                <a:latin typeface="Catamaran Bold"/>
+              </a:rPr>
+              <a:t>datos</a:t>
+            </a:r>
+            <a:r>
+              <a:rPr lang="en-US" sz="3899" dirty="0">
+                <a:solidFill>
+                  <a:srgbClr val="000000"/>
+                </a:solidFill>
+                <a:latin typeface="Catamaran Light"/>
+              </a:rPr>
+              <a:t> para </a:t>
+            </a:r>
+            <a:r>
+              <a:rPr lang="en-US" sz="3899" dirty="0" err="1">
+                <a:solidFill>
+                  <a:srgbClr val="000000"/>
+                </a:solidFill>
+                <a:latin typeface="Catamaran Light"/>
+              </a:rPr>
+              <a:t>lograr</a:t>
+            </a:r>
+            <a:r>
+              <a:rPr lang="en-US" sz="3899" dirty="0">
+                <a:solidFill>
+                  <a:srgbClr val="000000"/>
+                </a:solidFill>
+                <a:latin typeface="Catamaran Light"/>
+              </a:rPr>
+              <a:t> </a:t>
+            </a:r>
+            <a:r>
+              <a:rPr lang="en-US" sz="3899" dirty="0" err="1">
+                <a:solidFill>
+                  <a:srgbClr val="000000"/>
+                </a:solidFill>
+                <a:latin typeface="Catamaran Light"/>
+              </a:rPr>
+              <a:t>los</a:t>
+            </a:r>
+            <a:r>
+              <a:rPr lang="en-US" sz="3899" dirty="0">
+                <a:solidFill>
+                  <a:srgbClr val="000000"/>
+                </a:solidFill>
+                <a:latin typeface="Catamaran Light"/>
+              </a:rPr>
+              <a:t> </a:t>
+            </a:r>
+            <a:r>
+              <a:rPr lang="en-US" sz="3899" dirty="0" err="1">
+                <a:solidFill>
+                  <a:srgbClr val="000000"/>
+                </a:solidFill>
+                <a:latin typeface="Catamaran Light"/>
+              </a:rPr>
+              <a:t>objetivos</a:t>
+            </a:r>
+            <a:r>
+              <a:rPr lang="en-US" sz="3899" dirty="0">
+                <a:solidFill>
+                  <a:srgbClr val="000000"/>
+                </a:solidFill>
+                <a:latin typeface="Catamaran Light"/>
+              </a:rPr>
+              <a:t> de la </a:t>
+            </a:r>
+            <a:r>
+              <a:rPr lang="en-US" sz="3899" dirty="0" err="1">
+                <a:solidFill>
+                  <a:srgbClr val="000000"/>
+                </a:solidFill>
+                <a:latin typeface="Catamaran Light"/>
+              </a:rPr>
+              <a:t>aplicación</a:t>
+            </a:r>
+            <a:r>
+              <a:rPr lang="en-US" sz="3899" dirty="0">
+                <a:solidFill>
+                  <a:srgbClr val="000000"/>
+                </a:solidFill>
+                <a:latin typeface="Catamaran Light"/>
+              </a:rPr>
+              <a:t>.</a:t>
+            </a:r>
+          </a:p>
+          <a:p>
+            <a:pPr>
+              <a:lnSpc>
+                <a:spcPts val="5459"/>
+              </a:lnSpc>
+            </a:pPr>
+            <a:endParaRPr lang="en-US" sz="3899" dirty="0">
+              <a:solidFill>
+                <a:srgbClr val="000000"/>
+              </a:solidFill>
+              <a:latin typeface="Catamaran Light"/>
+            </a:endParaRPr>
+          </a:p>
+          <a:p>
+            <a:pPr>
+              <a:lnSpc>
+                <a:spcPts val="5459"/>
+              </a:lnSpc>
+            </a:pPr>
+            <a:r>
+              <a:rPr lang="en-US" sz="3899" dirty="0">
+                <a:solidFill>
+                  <a:srgbClr val="000000"/>
+                </a:solidFill>
+                <a:latin typeface="Catamaran Light"/>
+              </a:rPr>
+              <a:t>Tomar </a:t>
+            </a:r>
+            <a:r>
+              <a:rPr lang="en-US" sz="3899" dirty="0" err="1">
+                <a:solidFill>
+                  <a:srgbClr val="000000"/>
+                </a:solidFill>
+                <a:latin typeface="Catamaran Light"/>
+              </a:rPr>
+              <a:t>en</a:t>
+            </a:r>
+            <a:r>
+              <a:rPr lang="en-US" sz="3899" dirty="0">
+                <a:solidFill>
+                  <a:srgbClr val="000000"/>
+                </a:solidFill>
+                <a:latin typeface="Catamaran Light"/>
+              </a:rPr>
+              <a:t> </a:t>
+            </a:r>
+            <a:r>
+              <a:rPr lang="en-US" sz="3899" dirty="0" err="1">
+                <a:solidFill>
+                  <a:srgbClr val="000000"/>
+                </a:solidFill>
+                <a:latin typeface="Catamaran Light"/>
+              </a:rPr>
+              <a:t>cuenta</a:t>
+            </a:r>
+            <a:r>
+              <a:rPr lang="en-US" sz="3899" dirty="0">
+                <a:solidFill>
+                  <a:srgbClr val="000000"/>
+                </a:solidFill>
+                <a:latin typeface="Catamaran Light"/>
+              </a:rPr>
+              <a:t> la </a:t>
+            </a:r>
+            <a:r>
+              <a:rPr lang="en-US" sz="3899" dirty="0" err="1">
+                <a:solidFill>
+                  <a:srgbClr val="000000"/>
+                </a:solidFill>
+                <a:latin typeface="Catamaran Bold"/>
+              </a:rPr>
+              <a:t>relación</a:t>
+            </a:r>
+            <a:r>
+              <a:rPr lang="en-US" sz="3899" dirty="0">
+                <a:solidFill>
+                  <a:srgbClr val="000000"/>
+                </a:solidFill>
+                <a:latin typeface="Catamaran Light"/>
+              </a:rPr>
+              <a:t> que las </a:t>
+            </a:r>
+            <a:r>
+              <a:rPr lang="en-US" sz="3899" dirty="0" err="1">
+                <a:solidFill>
+                  <a:srgbClr val="000000"/>
+                </a:solidFill>
+                <a:latin typeface="Catamaran Light"/>
+              </a:rPr>
+              <a:t>clases</a:t>
+            </a:r>
+            <a:r>
+              <a:rPr lang="en-US" sz="3899" dirty="0">
+                <a:solidFill>
+                  <a:srgbClr val="000000"/>
+                </a:solidFill>
+                <a:latin typeface="Catamaran Light"/>
+              </a:rPr>
+              <a:t> </a:t>
+            </a:r>
+            <a:r>
+              <a:rPr lang="en-US" sz="3899" dirty="0" err="1">
+                <a:solidFill>
+                  <a:srgbClr val="000000"/>
+                </a:solidFill>
+                <a:latin typeface="Catamaran Light"/>
+              </a:rPr>
+              <a:t>han</a:t>
+            </a:r>
+            <a:r>
+              <a:rPr lang="en-US" sz="3899" dirty="0">
+                <a:solidFill>
+                  <a:srgbClr val="000000"/>
+                </a:solidFill>
+                <a:latin typeface="Catamaran Light"/>
+              </a:rPr>
+              <a:t> de </a:t>
+            </a:r>
+            <a:r>
+              <a:rPr lang="en-US" sz="3899" dirty="0" err="1">
+                <a:solidFill>
+                  <a:srgbClr val="000000"/>
+                </a:solidFill>
+                <a:latin typeface="Catamaran Light"/>
+              </a:rPr>
+              <a:t>tener</a:t>
+            </a:r>
+            <a:r>
+              <a:rPr lang="en-US" sz="3899" dirty="0">
+                <a:solidFill>
+                  <a:srgbClr val="000000"/>
+                </a:solidFill>
+                <a:latin typeface="Catamaran Light"/>
+              </a:rPr>
+              <a:t> entre </a:t>
+            </a:r>
+            <a:r>
+              <a:rPr lang="en-US" sz="3899" dirty="0" err="1">
+                <a:solidFill>
+                  <a:srgbClr val="000000"/>
+                </a:solidFill>
+                <a:latin typeface="Catamaran Light"/>
+              </a:rPr>
+              <a:t>ellas</a:t>
+            </a:r>
+            <a:r>
+              <a:rPr lang="en-US" sz="3899" dirty="0">
+                <a:solidFill>
+                  <a:srgbClr val="000000"/>
+                </a:solidFill>
+                <a:latin typeface="Catamaran Light"/>
+              </a:rPr>
+              <a:t>.</a:t>
+            </a:r>
+          </a:p>
+          <a:p>
+            <a:pPr>
+              <a:lnSpc>
+                <a:spcPts val="5459"/>
+              </a:lnSpc>
+            </a:pPr>
+            <a:endParaRPr lang="en-US" sz="3899" dirty="0">
+              <a:solidFill>
+                <a:srgbClr val="000000"/>
+              </a:solidFill>
+              <a:latin typeface="Catamaran Light"/>
+            </a:endParaRPr>
+          </a:p>
+        </p:txBody>
+      </p:sp>
+      <p:sp>
+        <p:nvSpPr>
+          <p:cNvPr id="3" name="TextBox 3"/>
+          <p:cNvSpPr txBox="1"/>
+          <p:nvPr/>
+        </p:nvSpPr>
+        <p:spPr>
+          <a:xfrm>
+            <a:off x="2484964" y="1152525"/>
+            <a:ext cx="8214942" cy="1031240"/>
+          </a:xfrm>
+          <a:prstGeom prst="rect">
+            <a:avLst/>
+          </a:prstGeom>
+        </p:spPr>
+        <p:txBody>
+          <a:bodyPr lIns="0" tIns="0" rIns="0" bIns="0" rtlCol="0" anchor="t">
+            <a:spAutoFit/>
+          </a:bodyPr>
+          <a:lstStyle/>
+          <a:p>
+            <a:pPr>
+              <a:lnSpc>
+                <a:spcPts val="7600"/>
+              </a:lnSpc>
+            </a:pPr>
+            <a:r>
+              <a:rPr lang="en-US" sz="7600">
+                <a:solidFill>
+                  <a:srgbClr val="000000"/>
+                </a:solidFill>
+                <a:latin typeface="Lovelo"/>
+              </a:rPr>
+              <a:t>poo</a:t>
+            </a:r>
+          </a:p>
+        </p:txBody>
+      </p:sp>
+      <p:sp>
+        <p:nvSpPr>
+          <p:cNvPr id="4" name="Freeform 4"/>
+          <p:cNvSpPr/>
+          <p:nvPr/>
+        </p:nvSpPr>
+        <p:spPr>
+          <a:xfrm>
+            <a:off x="11949584" y="3527771"/>
+            <a:ext cx="3348175" cy="3378892"/>
+          </a:xfrm>
+          <a:custGeom>
+            <a:avLst/>
+            <a:gdLst/>
+            <a:ahLst/>
+            <a:cxnLst/>
+            <a:rect l="l" t="t" r="r" b="b"/>
+            <a:pathLst>
+              <a:path w="3348175" h="3378892">
+                <a:moveTo>
+                  <a:pt x="0" y="0"/>
+                </a:moveTo>
+                <a:lnTo>
+                  <a:pt x="3348175" y="0"/>
+                </a:lnTo>
+                <a:lnTo>
+                  <a:pt x="3348175" y="3378892"/>
+                </a:lnTo>
+                <a:lnTo>
+                  <a:pt x="0" y="3378892"/>
+                </a:lnTo>
+                <a:lnTo>
+                  <a:pt x="0" y="0"/>
+                </a:lnTo>
+                <a:close/>
+              </a:path>
+            </a:pathLst>
+          </a:custGeom>
+          <a:blipFill>
+            <a:blip r:embed="rId2">
+              <a:extLst>
+                <a:ext uri="{96DAC541-7B7A-43D3-8B79-37D633B846F1}">
+                  <asvg:svgBlip xmlns:asvg="http://schemas.microsoft.com/office/drawing/2016/SVG/main" r:embed="rId3"/>
+                </a:ext>
+              </a:extLst>
+            </a:blip>
+            <a:stretch>
+              <a:fillRect/>
+            </a:stretch>
+          </a:blipFill>
+        </p:spPr>
+        <p:txBody>
+          <a:bodyPr/>
+          <a:lstStyle/>
+          <a:p>
+            <a:endParaRPr lang="en-US"/>
+          </a:p>
+        </p:txBody>
+      </p:sp>
+    </p:spTree>
+  </p:cSld>
+  <p:clrMapOvr>
+    <a:masterClrMapping/>
+  </p:clrMapOvr>
+</p:sld>
+</file>
+
+<file path=ppt/slides/slide40.xml><?xml version="1.0" encoding="utf-8"?>
 <p:sld xmlns:a="http://schemas.openxmlformats.org/drawingml/2006/main" xmlns:r="http://schemas.openxmlformats.org/officeDocument/2006/relationships" xmlns:p="http://schemas.openxmlformats.org/presentationml/2006/main">
   <p:cSld>
     <p:spTree>
@@ -10829,733 +11810,7 @@
 </p:sld>
 </file>
 
-<file path=ppt/slides/slide4.xml><?xml version="1.0" encoding="utf-8"?>
-<p:sld xmlns:a="http://schemas.openxmlformats.org/drawingml/2006/main" xmlns:r="http://schemas.openxmlformats.org/officeDocument/2006/relationships" xmlns:p="http://schemas.openxmlformats.org/presentationml/2006/main">
-  <p:cSld>
-    <p:spTree>
-      <p:nvGrpSpPr>
-        <p:cNvPr id="1" name=""/>
-        <p:cNvGrpSpPr/>
-        <p:nvPr/>
-      </p:nvGrpSpPr>
-      <p:grpSpPr>
-        <a:xfrm>
-          <a:off x="0" y="0"/>
-          <a:ext cx="0" cy="0"/>
-          <a:chOff x="0" y="0"/>
-          <a:chExt cx="0" cy="0"/>
-        </a:xfrm>
-      </p:grpSpPr>
-      <p:sp>
-        <p:nvSpPr>
-          <p:cNvPr id="2" name="TextBox 2"/>
-          <p:cNvSpPr txBox="1"/>
-          <p:nvPr/>
-        </p:nvSpPr>
-        <p:spPr>
-          <a:xfrm>
-            <a:off x="2329883" y="2422871"/>
-            <a:ext cx="7419857" cy="7758534"/>
-          </a:xfrm>
-          <a:prstGeom prst="rect">
-            <a:avLst/>
-          </a:prstGeom>
-        </p:spPr>
-        <p:txBody>
-          <a:bodyPr lIns="0" tIns="0" rIns="0" bIns="0" rtlCol="0" anchor="t">
-            <a:spAutoFit/>
-          </a:bodyPr>
-          <a:lstStyle/>
-          <a:p>
-            <a:pPr>
-              <a:lnSpc>
-                <a:spcPts val="5459"/>
-              </a:lnSpc>
-            </a:pPr>
-            <a:r>
-              <a:rPr lang="en-US" sz="3899" dirty="0">
-                <a:solidFill>
-                  <a:srgbClr val="000000"/>
-                </a:solidFill>
-                <a:latin typeface="Catamaran Light"/>
-              </a:rPr>
-              <a:t>Con </a:t>
-            </a:r>
-            <a:r>
-              <a:rPr lang="en-US" sz="3899" dirty="0" err="1">
-                <a:solidFill>
-                  <a:srgbClr val="000000"/>
-                </a:solidFill>
-                <a:latin typeface="Catamaran Light"/>
-              </a:rPr>
-              <a:t>este</a:t>
-            </a:r>
-            <a:r>
-              <a:rPr lang="en-US" sz="3899" dirty="0">
-                <a:solidFill>
-                  <a:srgbClr val="000000"/>
-                </a:solidFill>
-                <a:latin typeface="Catamaran Light"/>
-              </a:rPr>
-              <a:t> </a:t>
-            </a:r>
-            <a:r>
-              <a:rPr lang="en-US" sz="3899" dirty="0" err="1">
-                <a:solidFill>
-                  <a:srgbClr val="000000"/>
-                </a:solidFill>
-                <a:latin typeface="Catamaran Light"/>
-              </a:rPr>
-              <a:t>enfoque</a:t>
-            </a:r>
-            <a:r>
-              <a:rPr lang="en-US" sz="3899" dirty="0">
-                <a:solidFill>
-                  <a:srgbClr val="000000"/>
-                </a:solidFill>
-                <a:latin typeface="Catamaran Light"/>
-              </a:rPr>
-              <a:t> se </a:t>
-            </a:r>
-            <a:r>
-              <a:rPr lang="en-US" sz="3899" dirty="0" err="1">
-                <a:solidFill>
-                  <a:srgbClr val="000000"/>
-                </a:solidFill>
-                <a:latin typeface="Catamaran Light"/>
-              </a:rPr>
-              <a:t>organiza</a:t>
-            </a:r>
-            <a:r>
-              <a:rPr lang="en-US" sz="3899" dirty="0">
-                <a:solidFill>
-                  <a:srgbClr val="000000"/>
-                </a:solidFill>
-                <a:latin typeface="Catamaran Light"/>
-              </a:rPr>
-              <a:t> </a:t>
-            </a:r>
-            <a:r>
-              <a:rPr lang="en-US" sz="3899" dirty="0" err="1">
-                <a:solidFill>
-                  <a:srgbClr val="000000"/>
-                </a:solidFill>
-                <a:latin typeface="Catamaran Light"/>
-              </a:rPr>
-              <a:t>el</a:t>
-            </a:r>
-            <a:r>
-              <a:rPr lang="en-US" sz="3899" dirty="0">
-                <a:solidFill>
-                  <a:srgbClr val="000000"/>
-                </a:solidFill>
-                <a:latin typeface="Catamaran Light"/>
-              </a:rPr>
-              <a:t> </a:t>
-            </a:r>
-            <a:r>
-              <a:rPr lang="en-US" sz="3899" dirty="0" err="1">
-                <a:solidFill>
-                  <a:srgbClr val="000000"/>
-                </a:solidFill>
-                <a:latin typeface="Catamaran Light"/>
-              </a:rPr>
-              <a:t>código</a:t>
-            </a:r>
-            <a:r>
-              <a:rPr lang="en-US" sz="3899" dirty="0">
-                <a:solidFill>
-                  <a:srgbClr val="000000"/>
-                </a:solidFill>
-                <a:latin typeface="Catamaran Light"/>
-              </a:rPr>
-              <a:t> </a:t>
-            </a:r>
-            <a:r>
-              <a:rPr lang="en-US" sz="3899" dirty="0" err="1">
-                <a:solidFill>
-                  <a:srgbClr val="000000"/>
-                </a:solidFill>
-                <a:latin typeface="Catamaran Light"/>
-              </a:rPr>
-              <a:t>en</a:t>
-            </a:r>
-            <a:r>
-              <a:rPr lang="en-US" sz="3899" dirty="0">
-                <a:solidFill>
-                  <a:srgbClr val="000000"/>
-                </a:solidFill>
-                <a:latin typeface="Catamaran Light"/>
-              </a:rPr>
-              <a:t> </a:t>
-            </a:r>
-            <a:r>
-              <a:rPr lang="en-US" sz="3899" dirty="0" err="1">
-                <a:solidFill>
-                  <a:srgbClr val="000000"/>
-                </a:solidFill>
-                <a:latin typeface="Catamaran Light"/>
-              </a:rPr>
-              <a:t>unidades</a:t>
-            </a:r>
-            <a:r>
-              <a:rPr lang="en-US" sz="3899" dirty="0">
-                <a:solidFill>
-                  <a:srgbClr val="000000"/>
-                </a:solidFill>
-                <a:latin typeface="Catamaran Light"/>
-              </a:rPr>
-              <a:t> </a:t>
-            </a:r>
-            <a:r>
-              <a:rPr lang="en-US" sz="3899" dirty="0" err="1">
-                <a:solidFill>
-                  <a:srgbClr val="000000"/>
-                </a:solidFill>
-                <a:latin typeface="Catamaran Light"/>
-              </a:rPr>
-              <a:t>llamadas</a:t>
-            </a:r>
-            <a:r>
-              <a:rPr lang="en-US" sz="3899" dirty="0">
-                <a:solidFill>
-                  <a:srgbClr val="000000"/>
-                </a:solidFill>
-                <a:latin typeface="Catamaran Light"/>
-              </a:rPr>
-              <a:t> </a:t>
-            </a:r>
-            <a:r>
-              <a:rPr lang="en-US" sz="3899" dirty="0" err="1">
-                <a:solidFill>
-                  <a:srgbClr val="000000"/>
-                </a:solidFill>
-                <a:latin typeface="Catamaran Bold"/>
-              </a:rPr>
-              <a:t>clases</a:t>
-            </a:r>
-            <a:r>
-              <a:rPr lang="en-US" sz="3899" dirty="0">
-                <a:solidFill>
-                  <a:srgbClr val="000000"/>
-                </a:solidFill>
-                <a:latin typeface="Catamaran Light"/>
-              </a:rPr>
-              <a:t>.</a:t>
-            </a:r>
-          </a:p>
-          <a:p>
-            <a:pPr>
-              <a:lnSpc>
-                <a:spcPts val="5459"/>
-              </a:lnSpc>
-            </a:pPr>
-            <a:endParaRPr lang="en-US" sz="3899" dirty="0">
-              <a:solidFill>
-                <a:srgbClr val="000000"/>
-              </a:solidFill>
-              <a:latin typeface="Catamaran Light"/>
-            </a:endParaRPr>
-          </a:p>
-          <a:p>
-            <a:pPr>
-              <a:lnSpc>
-                <a:spcPts val="5459"/>
-              </a:lnSpc>
-            </a:pPr>
-            <a:r>
-              <a:rPr lang="en-US" sz="3899" dirty="0">
-                <a:solidFill>
-                  <a:srgbClr val="000000"/>
-                </a:solidFill>
-                <a:latin typeface="Catamaran Light"/>
-              </a:rPr>
-              <a:t>En las </a:t>
-            </a:r>
-            <a:r>
-              <a:rPr lang="en-US" sz="3899" dirty="0" err="1">
-                <a:solidFill>
-                  <a:srgbClr val="000000"/>
-                </a:solidFill>
-                <a:latin typeface="Catamaran Light"/>
-              </a:rPr>
-              <a:t>clases</a:t>
-            </a:r>
-            <a:r>
-              <a:rPr lang="en-US" sz="3899" dirty="0">
-                <a:solidFill>
-                  <a:srgbClr val="000000"/>
-                </a:solidFill>
-                <a:latin typeface="Catamaran Light"/>
-              </a:rPr>
-              <a:t> </a:t>
-            </a:r>
-            <a:r>
-              <a:rPr lang="en-US" sz="3899" dirty="0" err="1">
-                <a:solidFill>
-                  <a:srgbClr val="000000"/>
-                </a:solidFill>
-                <a:latin typeface="Catamaran Light"/>
-              </a:rPr>
-              <a:t>tú</a:t>
-            </a:r>
-            <a:r>
-              <a:rPr lang="en-US" sz="3899" dirty="0">
-                <a:solidFill>
-                  <a:srgbClr val="000000"/>
-                </a:solidFill>
-                <a:latin typeface="Catamaran Light"/>
-              </a:rPr>
-              <a:t> pones las </a:t>
-            </a:r>
-            <a:r>
-              <a:rPr lang="en-US" sz="3899" dirty="0" err="1">
-                <a:solidFill>
-                  <a:srgbClr val="000000"/>
-                </a:solidFill>
-                <a:latin typeface="Catamaran Light"/>
-              </a:rPr>
-              <a:t>distintas</a:t>
-            </a:r>
-            <a:r>
-              <a:rPr lang="en-US" sz="3899" dirty="0">
-                <a:solidFill>
-                  <a:srgbClr val="000000"/>
-                </a:solidFill>
-                <a:latin typeface="Catamaran Light"/>
-              </a:rPr>
-              <a:t> </a:t>
-            </a:r>
-            <a:r>
-              <a:rPr lang="en-US" sz="3899" dirty="0" err="1">
-                <a:solidFill>
-                  <a:srgbClr val="000000"/>
-                </a:solidFill>
-                <a:latin typeface="Catamaran Bold"/>
-              </a:rPr>
-              <a:t>funcionalidades</a:t>
-            </a:r>
-            <a:r>
-              <a:rPr lang="en-US" sz="3899" dirty="0">
-                <a:solidFill>
-                  <a:srgbClr val="000000"/>
-                </a:solidFill>
-                <a:latin typeface="Catamaran Bold"/>
-              </a:rPr>
-              <a:t>, </a:t>
-            </a:r>
-            <a:r>
-              <a:rPr lang="en-US" sz="3899" dirty="0">
-                <a:solidFill>
-                  <a:srgbClr val="000000"/>
-                </a:solidFill>
-                <a:latin typeface="Catamaran Light"/>
-              </a:rPr>
-              <a:t>y/o </a:t>
-            </a:r>
-            <a:r>
-              <a:rPr lang="en-US" sz="3899" dirty="0" err="1">
-                <a:solidFill>
-                  <a:srgbClr val="000000"/>
-                </a:solidFill>
-                <a:latin typeface="Catamaran Light"/>
-              </a:rPr>
-              <a:t>modelar</a:t>
-            </a:r>
-            <a:r>
-              <a:rPr lang="en-US" sz="3899" dirty="0">
-                <a:solidFill>
-                  <a:srgbClr val="000000"/>
-                </a:solidFill>
-                <a:latin typeface="Catamaran Light"/>
-              </a:rPr>
-              <a:t> </a:t>
-            </a:r>
-            <a:r>
-              <a:rPr lang="en-US" sz="3899" dirty="0" err="1">
-                <a:solidFill>
-                  <a:srgbClr val="000000"/>
-                </a:solidFill>
-                <a:latin typeface="Catamaran Light"/>
-              </a:rPr>
-              <a:t>los</a:t>
-            </a:r>
-            <a:r>
-              <a:rPr lang="en-US" sz="3899" dirty="0">
-                <a:solidFill>
-                  <a:srgbClr val="000000"/>
-                </a:solidFill>
-                <a:latin typeface="Catamaran Light"/>
-              </a:rPr>
-              <a:t> </a:t>
-            </a:r>
-            <a:r>
-              <a:rPr lang="en-US" sz="3899" dirty="0" err="1">
-                <a:solidFill>
-                  <a:srgbClr val="000000"/>
-                </a:solidFill>
-                <a:latin typeface="Catamaran Bold"/>
-              </a:rPr>
-              <a:t>datos</a:t>
-            </a:r>
-            <a:r>
-              <a:rPr lang="en-US" sz="3899" dirty="0">
-                <a:solidFill>
-                  <a:srgbClr val="000000"/>
-                </a:solidFill>
-                <a:latin typeface="Catamaran Light"/>
-              </a:rPr>
-              <a:t> para </a:t>
-            </a:r>
-            <a:r>
-              <a:rPr lang="en-US" sz="3899" dirty="0" err="1">
-                <a:solidFill>
-                  <a:srgbClr val="000000"/>
-                </a:solidFill>
-                <a:latin typeface="Catamaran Light"/>
-              </a:rPr>
-              <a:t>lograr</a:t>
-            </a:r>
-            <a:r>
-              <a:rPr lang="en-US" sz="3899" dirty="0">
-                <a:solidFill>
-                  <a:srgbClr val="000000"/>
-                </a:solidFill>
-                <a:latin typeface="Catamaran Light"/>
-              </a:rPr>
-              <a:t> </a:t>
-            </a:r>
-            <a:r>
-              <a:rPr lang="en-US" sz="3899" dirty="0" err="1">
-                <a:solidFill>
-                  <a:srgbClr val="000000"/>
-                </a:solidFill>
-                <a:latin typeface="Catamaran Light"/>
-              </a:rPr>
-              <a:t>los</a:t>
-            </a:r>
-            <a:r>
-              <a:rPr lang="en-US" sz="3899" dirty="0">
-                <a:solidFill>
-                  <a:srgbClr val="000000"/>
-                </a:solidFill>
-                <a:latin typeface="Catamaran Light"/>
-              </a:rPr>
-              <a:t> </a:t>
-            </a:r>
-            <a:r>
-              <a:rPr lang="en-US" sz="3899" dirty="0" err="1">
-                <a:solidFill>
-                  <a:srgbClr val="000000"/>
-                </a:solidFill>
-                <a:latin typeface="Catamaran Light"/>
-              </a:rPr>
-              <a:t>objetivos</a:t>
-            </a:r>
-            <a:r>
-              <a:rPr lang="en-US" sz="3899" dirty="0">
-                <a:solidFill>
-                  <a:srgbClr val="000000"/>
-                </a:solidFill>
-                <a:latin typeface="Catamaran Light"/>
-              </a:rPr>
-              <a:t> de la </a:t>
-            </a:r>
-            <a:r>
-              <a:rPr lang="en-US" sz="3899" dirty="0" err="1">
-                <a:solidFill>
-                  <a:srgbClr val="000000"/>
-                </a:solidFill>
-                <a:latin typeface="Catamaran Light"/>
-              </a:rPr>
-              <a:t>aplicación</a:t>
-            </a:r>
-            <a:r>
-              <a:rPr lang="en-US" sz="3899" dirty="0">
-                <a:solidFill>
-                  <a:srgbClr val="000000"/>
-                </a:solidFill>
-                <a:latin typeface="Catamaran Light"/>
-              </a:rPr>
-              <a:t>.</a:t>
-            </a:r>
-          </a:p>
-          <a:p>
-            <a:pPr>
-              <a:lnSpc>
-                <a:spcPts val="5459"/>
-              </a:lnSpc>
-            </a:pPr>
-            <a:endParaRPr lang="en-US" sz="3899" dirty="0">
-              <a:solidFill>
-                <a:srgbClr val="000000"/>
-              </a:solidFill>
-              <a:latin typeface="Catamaran Light"/>
-            </a:endParaRPr>
-          </a:p>
-          <a:p>
-            <a:pPr>
-              <a:lnSpc>
-                <a:spcPts val="5459"/>
-              </a:lnSpc>
-            </a:pPr>
-            <a:r>
-              <a:rPr lang="en-US" sz="3899" dirty="0">
-                <a:solidFill>
-                  <a:srgbClr val="000000"/>
-                </a:solidFill>
-                <a:latin typeface="Catamaran Light"/>
-              </a:rPr>
-              <a:t>Tomar </a:t>
-            </a:r>
-            <a:r>
-              <a:rPr lang="en-US" sz="3899" dirty="0" err="1">
-                <a:solidFill>
-                  <a:srgbClr val="000000"/>
-                </a:solidFill>
-                <a:latin typeface="Catamaran Light"/>
-              </a:rPr>
-              <a:t>en</a:t>
-            </a:r>
-            <a:r>
-              <a:rPr lang="en-US" sz="3899" dirty="0">
-                <a:solidFill>
-                  <a:srgbClr val="000000"/>
-                </a:solidFill>
-                <a:latin typeface="Catamaran Light"/>
-              </a:rPr>
-              <a:t> </a:t>
-            </a:r>
-            <a:r>
-              <a:rPr lang="en-US" sz="3899" dirty="0" err="1">
-                <a:solidFill>
-                  <a:srgbClr val="000000"/>
-                </a:solidFill>
-                <a:latin typeface="Catamaran Light"/>
-              </a:rPr>
-              <a:t>cuenta</a:t>
-            </a:r>
-            <a:r>
-              <a:rPr lang="en-US" sz="3899" dirty="0">
-                <a:solidFill>
-                  <a:srgbClr val="000000"/>
-                </a:solidFill>
-                <a:latin typeface="Catamaran Light"/>
-              </a:rPr>
-              <a:t> la </a:t>
-            </a:r>
-            <a:r>
-              <a:rPr lang="en-US" sz="3899" dirty="0" err="1">
-                <a:solidFill>
-                  <a:srgbClr val="000000"/>
-                </a:solidFill>
-                <a:latin typeface="Catamaran Bold"/>
-              </a:rPr>
-              <a:t>relación</a:t>
-            </a:r>
-            <a:r>
-              <a:rPr lang="en-US" sz="3899" dirty="0">
-                <a:solidFill>
-                  <a:srgbClr val="000000"/>
-                </a:solidFill>
-                <a:latin typeface="Catamaran Light"/>
-              </a:rPr>
-              <a:t> que las </a:t>
-            </a:r>
-            <a:r>
-              <a:rPr lang="en-US" sz="3899" dirty="0" err="1">
-                <a:solidFill>
-                  <a:srgbClr val="000000"/>
-                </a:solidFill>
-                <a:latin typeface="Catamaran Light"/>
-              </a:rPr>
-              <a:t>clases</a:t>
-            </a:r>
-            <a:r>
-              <a:rPr lang="en-US" sz="3899" dirty="0">
-                <a:solidFill>
-                  <a:srgbClr val="000000"/>
-                </a:solidFill>
-                <a:latin typeface="Catamaran Light"/>
-              </a:rPr>
-              <a:t> </a:t>
-            </a:r>
-            <a:r>
-              <a:rPr lang="en-US" sz="3899" dirty="0" err="1">
-                <a:solidFill>
-                  <a:srgbClr val="000000"/>
-                </a:solidFill>
-                <a:latin typeface="Catamaran Light"/>
-              </a:rPr>
-              <a:t>han</a:t>
-            </a:r>
-            <a:r>
-              <a:rPr lang="en-US" sz="3899" dirty="0">
-                <a:solidFill>
-                  <a:srgbClr val="000000"/>
-                </a:solidFill>
-                <a:latin typeface="Catamaran Light"/>
-              </a:rPr>
-              <a:t> de </a:t>
-            </a:r>
-            <a:r>
-              <a:rPr lang="en-US" sz="3899" dirty="0" err="1">
-                <a:solidFill>
-                  <a:srgbClr val="000000"/>
-                </a:solidFill>
-                <a:latin typeface="Catamaran Light"/>
-              </a:rPr>
-              <a:t>tener</a:t>
-            </a:r>
-            <a:r>
-              <a:rPr lang="en-US" sz="3899" dirty="0">
-                <a:solidFill>
-                  <a:srgbClr val="000000"/>
-                </a:solidFill>
-                <a:latin typeface="Catamaran Light"/>
-              </a:rPr>
-              <a:t> entre </a:t>
-            </a:r>
-            <a:r>
-              <a:rPr lang="en-US" sz="3899" dirty="0" err="1">
-                <a:solidFill>
-                  <a:srgbClr val="000000"/>
-                </a:solidFill>
-                <a:latin typeface="Catamaran Light"/>
-              </a:rPr>
-              <a:t>ellas</a:t>
-            </a:r>
-            <a:r>
-              <a:rPr lang="en-US" sz="3899" dirty="0">
-                <a:solidFill>
-                  <a:srgbClr val="000000"/>
-                </a:solidFill>
-                <a:latin typeface="Catamaran Light"/>
-              </a:rPr>
-              <a:t>.</a:t>
-            </a:r>
-          </a:p>
-          <a:p>
-            <a:pPr>
-              <a:lnSpc>
-                <a:spcPts val="5459"/>
-              </a:lnSpc>
-            </a:pPr>
-            <a:endParaRPr lang="en-US" sz="3899" dirty="0">
-              <a:solidFill>
-                <a:srgbClr val="000000"/>
-              </a:solidFill>
-              <a:latin typeface="Catamaran Light"/>
-            </a:endParaRPr>
-          </a:p>
-        </p:txBody>
-      </p:sp>
-      <p:sp>
-        <p:nvSpPr>
-          <p:cNvPr id="3" name="TextBox 3"/>
-          <p:cNvSpPr txBox="1"/>
-          <p:nvPr/>
-        </p:nvSpPr>
-        <p:spPr>
-          <a:xfrm>
-            <a:off x="2484964" y="1152525"/>
-            <a:ext cx="8214942" cy="1031240"/>
-          </a:xfrm>
-          <a:prstGeom prst="rect">
-            <a:avLst/>
-          </a:prstGeom>
-        </p:spPr>
-        <p:txBody>
-          <a:bodyPr lIns="0" tIns="0" rIns="0" bIns="0" rtlCol="0" anchor="t">
-            <a:spAutoFit/>
-          </a:bodyPr>
-          <a:lstStyle/>
-          <a:p>
-            <a:pPr>
-              <a:lnSpc>
-                <a:spcPts val="7600"/>
-              </a:lnSpc>
-            </a:pPr>
-            <a:r>
-              <a:rPr lang="en-US" sz="7600">
-                <a:solidFill>
-                  <a:srgbClr val="000000"/>
-                </a:solidFill>
-                <a:latin typeface="Lovelo"/>
-              </a:rPr>
-              <a:t>poo</a:t>
-            </a:r>
-          </a:p>
-        </p:txBody>
-      </p:sp>
-      <p:sp>
-        <p:nvSpPr>
-          <p:cNvPr id="4" name="Freeform 4"/>
-          <p:cNvSpPr/>
-          <p:nvPr/>
-        </p:nvSpPr>
-        <p:spPr>
-          <a:xfrm>
-            <a:off x="11949584" y="3527771"/>
-            <a:ext cx="3348175" cy="3378892"/>
-          </a:xfrm>
-          <a:custGeom>
-            <a:avLst/>
-            <a:gdLst/>
-            <a:ahLst/>
-            <a:cxnLst/>
-            <a:rect l="l" t="t" r="r" b="b"/>
-            <a:pathLst>
-              <a:path w="3348175" h="3378892">
-                <a:moveTo>
-                  <a:pt x="0" y="0"/>
-                </a:moveTo>
-                <a:lnTo>
-                  <a:pt x="3348175" y="0"/>
-                </a:lnTo>
-                <a:lnTo>
-                  <a:pt x="3348175" y="3378892"/>
-                </a:lnTo>
-                <a:lnTo>
-                  <a:pt x="0" y="3378892"/>
-                </a:lnTo>
-                <a:lnTo>
-                  <a:pt x="0" y="0"/>
-                </a:lnTo>
-                <a:close/>
-              </a:path>
-            </a:pathLst>
-          </a:custGeom>
-          <a:blipFill>
-            <a:blip r:embed="rId2">
-              <a:extLst>
-                <a:ext uri="{96DAC541-7B7A-43D3-8B79-37D633B846F1}">
-                  <asvg:svgBlip xmlns:asvg="http://schemas.microsoft.com/office/drawing/2016/SVG/main" r:embed="rId3"/>
-                </a:ext>
-              </a:extLst>
-            </a:blip>
-            <a:stretch>
-              <a:fillRect/>
-            </a:stretch>
-          </a:blipFill>
-        </p:spPr>
-        <p:txBody>
-          <a:bodyPr/>
-          <a:lstStyle/>
-          <a:p>
-            <a:endParaRPr lang="en-US"/>
-          </a:p>
-        </p:txBody>
-      </p:sp>
-    </p:spTree>
-  </p:cSld>
-  <p:clrMapOvr>
-    <a:masterClrMapping/>
-  </p:clrMapOvr>
-</p:sld>
-</file>
-
-<file path=ppt/slides/slide40.xml><?xml version="1.0" encoding="utf-8"?>
+<file path=ppt/slides/slide41.xml><?xml version="1.0" encoding="utf-8"?>
 <p:sld xmlns:a="http://schemas.openxmlformats.org/drawingml/2006/main" xmlns:r="http://schemas.openxmlformats.org/officeDocument/2006/relationships" xmlns:p="http://schemas.openxmlformats.org/presentationml/2006/main">
   <p:cSld>
     <p:spTree>
@@ -12077,7 +12332,7 @@
 </p:sld>
 </file>
 
-<file path=ppt/slides/slide41.xml><?xml version="1.0" encoding="utf-8"?>
+<file path=ppt/slides/slide42.xml><?xml version="1.0" encoding="utf-8"?>
 <p:sld xmlns:a="http://schemas.openxmlformats.org/drawingml/2006/main" xmlns:r="http://schemas.openxmlformats.org/officeDocument/2006/relationships" xmlns:p="http://schemas.openxmlformats.org/presentationml/2006/main">
   <p:cSld>
     <p:bg>
@@ -12388,7 +12643,7 @@
 </p:sld>
 </file>
 
-<file path=ppt/slides/slide42.xml><?xml version="1.0" encoding="utf-8"?>
+<file path=ppt/slides/slide43.xml><?xml version="1.0" encoding="utf-8"?>
 <p:sld xmlns:a="http://schemas.openxmlformats.org/drawingml/2006/main" xmlns:r="http://schemas.openxmlformats.org/officeDocument/2006/relationships" xmlns:p="http://schemas.openxmlformats.org/presentationml/2006/main">
   <p:cSld>
     <p:bg>
@@ -12577,7 +12832,7 @@
 </p:sld>
 </file>
 
-<file path=ppt/slides/slide43.xml><?xml version="1.0" encoding="utf-8"?>
+<file path=ppt/slides/slide44.xml><?xml version="1.0" encoding="utf-8"?>
 <p:sld xmlns:a="http://schemas.openxmlformats.org/drawingml/2006/main" xmlns:r="http://schemas.openxmlformats.org/officeDocument/2006/relationships" xmlns:p="http://schemas.openxmlformats.org/presentationml/2006/main">
   <p:cSld>
     <p:spTree>
@@ -12804,7 +13059,7 @@
 </p:sld>
 </file>
 
-<file path=ppt/slides/slide44.xml><?xml version="1.0" encoding="utf-8"?>
+<file path=ppt/slides/slide45.xml><?xml version="1.0" encoding="utf-8"?>
 <p:sld xmlns:a="http://schemas.openxmlformats.org/drawingml/2006/main" xmlns:r="http://schemas.openxmlformats.org/officeDocument/2006/relationships" xmlns:p="http://schemas.openxmlformats.org/presentationml/2006/main">
   <p:cSld>
     <p:bg>

</xml_diff>